<commit_message>
jail & seip updated
</commit_message>
<xml_diff>
--- a/Jail/Jail_Presentation.pptx
+++ b/Jail/Jail_Presentation.pptx
@@ -16,7 +16,7 @@
     <p:sldId id="296" r:id="rId7"/>
     <p:sldId id="297" r:id="rId8"/>
     <p:sldId id="298" r:id="rId9"/>
-    <p:sldId id="313" r:id="rId10"/>
+    <p:sldId id="315" r:id="rId10"/>
     <p:sldId id="299" r:id="rId11"/>
     <p:sldId id="300" r:id="rId12"/>
     <p:sldId id="301" r:id="rId13"/>
@@ -29,7 +29,7 @@
     <p:sldId id="309" r:id="rId20"/>
     <p:sldId id="310" r:id="rId21"/>
     <p:sldId id="311" r:id="rId22"/>
-    <p:sldId id="312" r:id="rId23"/>
+    <p:sldId id="314" r:id="rId23"/>
     <p:sldId id="287" r:id="rId24"/>
     <p:sldId id="275" r:id="rId25"/>
   </p:sldIdLst>
@@ -231,7 +231,7 @@
           <a:p>
             <a:fld id="{8974B838-77B8-4D9C-9F16-E870927FFB05}" type="datetimeFigureOut">
               <a:rPr lang="en-US" smtClean="0"/>
-              <a:t>12/9/2020</a:t>
+              <a:t>12/10/2020</a:t>
             </a:fld>
             <a:endParaRPr lang="en-US"/>
           </a:p>
@@ -1748,7 +1748,7 @@
     </p:spTree>
     <p:extLst>
       <p:ext uri="{BB962C8B-B14F-4D97-AF65-F5344CB8AC3E}">
-        <p14:creationId xmlns:p14="http://schemas.microsoft.com/office/powerpoint/2010/main" val="971858298"/>
+        <p14:creationId xmlns:p14="http://schemas.microsoft.com/office/powerpoint/2010/main" val="3009792335"/>
       </p:ext>
     </p:extLst>
   </p:cSld>
@@ -2504,7 +2504,7 @@
     </p:spTree>
     <p:extLst>
       <p:ext uri="{BB962C8B-B14F-4D97-AF65-F5344CB8AC3E}">
-        <p14:creationId xmlns:p14="http://schemas.microsoft.com/office/powerpoint/2010/main" val="1672376440"/>
+        <p14:creationId xmlns:p14="http://schemas.microsoft.com/office/powerpoint/2010/main" val="539987703"/>
       </p:ext>
     </p:extLst>
   </p:cSld>
@@ -2719,7 +2719,7 @@
             <a:fld id="{53074F12-AA26-4AC8-9962-C36BB8F32554}" type="datetimeFigureOut">
               <a:rPr lang="en-US" smtClean="0"/>
               <a:pPr/>
-              <a:t>12/9/2020</a:t>
+              <a:t>12/10/2020</a:t>
             </a:fld>
             <a:endParaRPr lang="en-US"/>
           </a:p>
@@ -3026,7 +3026,7 @@
             <a:fld id="{53074F12-AA26-4AC8-9962-C36BB8F32554}" type="datetimeFigureOut">
               <a:rPr lang="en-US" smtClean="0"/>
               <a:pPr/>
-              <a:t>12/9/2020</a:t>
+              <a:t>12/10/2020</a:t>
             </a:fld>
             <a:endParaRPr lang="en-US"/>
           </a:p>
@@ -3196,7 +3196,7 @@
             <a:fld id="{53074F12-AA26-4AC8-9962-C36BB8F32554}" type="datetimeFigureOut">
               <a:rPr lang="en-US" smtClean="0"/>
               <a:pPr/>
-              <a:t>12/9/2020</a:t>
+              <a:t>12/10/2020</a:t>
             </a:fld>
             <a:endParaRPr lang="en-US"/>
           </a:p>
@@ -3376,7 +3376,7 @@
             <a:fld id="{53074F12-AA26-4AC8-9962-C36BB8F32554}" type="datetimeFigureOut">
               <a:rPr lang="en-US" smtClean="0"/>
               <a:pPr/>
-              <a:t>12/9/2020</a:t>
+              <a:t>12/10/2020</a:t>
             </a:fld>
             <a:endParaRPr lang="en-US"/>
           </a:p>
@@ -3658,7 +3658,7 @@
             <a:fld id="{53074F12-AA26-4AC8-9962-C36BB8F32554}" type="datetimeFigureOut">
               <a:rPr lang="en-US" smtClean="0"/>
               <a:pPr/>
-              <a:t>12/9/2020</a:t>
+              <a:t>12/10/2020</a:t>
             </a:fld>
             <a:endParaRPr lang="en-US"/>
           </a:p>
@@ -3891,7 +3891,7 @@
             <a:fld id="{53074F12-AA26-4AC8-9962-C36BB8F32554}" type="datetimeFigureOut">
               <a:rPr lang="en-US" smtClean="0"/>
               <a:pPr/>
-              <a:t>12/9/2020</a:t>
+              <a:t>12/10/2020</a:t>
             </a:fld>
             <a:endParaRPr lang="en-US"/>
           </a:p>
@@ -4138,7 +4138,7 @@
             <a:fld id="{53074F12-AA26-4AC8-9962-C36BB8F32554}" type="datetimeFigureOut">
               <a:rPr lang="en-US" smtClean="0"/>
               <a:pPr/>
-              <a:t>12/9/2020</a:t>
+              <a:t>12/10/2020</a:t>
             </a:fld>
             <a:endParaRPr lang="en-US"/>
           </a:p>
@@ -4425,7 +4425,7 @@
             <a:fld id="{53074F12-AA26-4AC8-9962-C36BB8F32554}" type="datetimeFigureOut">
               <a:rPr lang="en-US" smtClean="0"/>
               <a:pPr/>
-              <a:t>12/9/2020</a:t>
+              <a:t>12/10/2020</a:t>
             </a:fld>
             <a:endParaRPr lang="en-US"/>
           </a:p>
@@ -4912,7 +4912,7 @@
             <a:fld id="{53074F12-AA26-4AC8-9962-C36BB8F32554}" type="datetimeFigureOut">
               <a:rPr lang="en-US" smtClean="0"/>
               <a:pPr/>
-              <a:t>12/9/2020</a:t>
+              <a:t>12/10/2020</a:t>
             </a:fld>
             <a:endParaRPr lang="en-US"/>
           </a:p>
@@ -5031,7 +5031,7 @@
             <a:fld id="{53074F12-AA26-4AC8-9962-C36BB8F32554}" type="datetimeFigureOut">
               <a:rPr lang="en-US" smtClean="0"/>
               <a:pPr/>
-              <a:t>12/9/2020</a:t>
+              <a:t>12/10/2020</a:t>
             </a:fld>
             <a:endParaRPr lang="en-US"/>
           </a:p>
@@ -5128,7 +5128,7 @@
             <a:fld id="{53074F12-AA26-4AC8-9962-C36BB8F32554}" type="datetimeFigureOut">
               <a:rPr lang="en-US" smtClean="0"/>
               <a:pPr/>
-              <a:t>12/9/2020</a:t>
+              <a:t>12/10/2020</a:t>
             </a:fld>
             <a:endParaRPr lang="en-US"/>
           </a:p>
@@ -5405,7 +5405,7 @@
             <a:fld id="{53074F12-AA26-4AC8-9962-C36BB8F32554}" type="datetimeFigureOut">
               <a:rPr lang="en-US" smtClean="0"/>
               <a:pPr/>
-              <a:t>12/9/2020</a:t>
+              <a:t>12/10/2020</a:t>
             </a:fld>
             <a:endParaRPr lang="en-US"/>
           </a:p>
@@ -5621,7 +5621,7 @@
             <a:fld id="{53074F12-AA26-4AC8-9962-C36BB8F32554}" type="datetimeFigureOut">
               <a:rPr lang="en-US" smtClean="0"/>
               <a:pPr/>
-              <a:t>12/9/2020</a:t>
+              <a:t>12/10/2020</a:t>
             </a:fld>
             <a:endParaRPr lang="en-US"/>
           </a:p>
@@ -6186,6 +6186,13 @@
                 <a:solidFill>
                   <a:schemeClr val="tx1"/>
                 </a:solidFill>
+                <a:effectLst>
+                  <a:outerShdw blurRad="38100" dist="38100" dir="2700000" algn="tl">
+                    <a:srgbClr val="000000">
+                      <a:alpha val="43137"/>
+                    </a:srgbClr>
+                  </a:outerShdw>
+                </a:effectLst>
                 <a:latin typeface="Times New Roman" panose="02020603050405020304" pitchFamily="18" charset="0"/>
                 <a:cs typeface="Times New Roman" panose="02020603050405020304" pitchFamily="18" charset="0"/>
               </a:rPr>
@@ -6196,6 +6203,13 @@
                 <a:solidFill>
                   <a:schemeClr val="tx1"/>
                 </a:solidFill>
+                <a:effectLst>
+                  <a:outerShdw blurRad="38100" dist="38100" dir="2700000" algn="tl">
+                    <a:srgbClr val="000000">
+                      <a:alpha val="43137"/>
+                    </a:srgbClr>
+                  </a:outerShdw>
+                </a:effectLst>
                 <a:latin typeface="Times New Roman" panose="02020603050405020304" pitchFamily="18" charset="0"/>
                 <a:cs typeface="Times New Roman" panose="02020603050405020304" pitchFamily="18" charset="0"/>
               </a:rPr>
@@ -6205,6 +6219,13 @@
               <a:solidFill>
                 <a:schemeClr val="tx1"/>
               </a:solidFill>
+              <a:effectLst>
+                <a:outerShdw blurRad="38100" dist="38100" dir="2700000" algn="tl">
+                  <a:srgbClr val="000000">
+                    <a:alpha val="43137"/>
+                  </a:srgbClr>
+                </a:outerShdw>
+              </a:effectLst>
               <a:latin typeface="Times New Roman" panose="02020603050405020304" pitchFamily="18" charset="0"/>
               <a:cs typeface="Times New Roman" panose="02020603050405020304" pitchFamily="18" charset="0"/>
             </a:endParaRPr>
@@ -7015,6 +7036,11 @@
           <a:prstGeom prst="rect">
             <a:avLst/>
           </a:prstGeom>
+          <a:ln>
+            <a:solidFill>
+              <a:schemeClr val="tx1"/>
+            </a:solidFill>
+          </a:ln>
         </p:spPr>
       </p:pic>
     </p:spTree>
@@ -7388,6 +7414,11 @@
           <a:prstGeom prst="rect">
             <a:avLst/>
           </a:prstGeom>
+          <a:ln>
+            <a:solidFill>
+              <a:schemeClr val="tx1"/>
+            </a:solidFill>
+          </a:ln>
         </p:spPr>
       </p:pic>
     </p:spTree>
@@ -7875,12 +7906,17 @@
         </p:blipFill>
         <p:spPr>
           <a:xfrm>
-            <a:off x="7244335" y="1988697"/>
-            <a:ext cx="1374345" cy="2152650"/>
+            <a:off x="7061942" y="1541427"/>
+            <a:ext cx="1553356" cy="2060646"/>
           </a:xfrm>
           <a:prstGeom prst="rect">
             <a:avLst/>
           </a:prstGeom>
+          <a:ln>
+            <a:solidFill>
+              <a:schemeClr val="bg1"/>
+            </a:solidFill>
+          </a:ln>
         </p:spPr>
       </p:pic>
     </p:spTree>
@@ -8004,14 +8040,14 @@
           <p:nvPr>
             <p:extLst>
               <p:ext uri="{D42A27DB-BD31-4B8C-83A1-F6EECF244321}">
-                <p14:modId xmlns:p14="http://schemas.microsoft.com/office/powerpoint/2010/main" val="2673387507"/>
+                <p14:modId xmlns:p14="http://schemas.microsoft.com/office/powerpoint/2010/main" val="1854893909"/>
               </p:ext>
             </p:extLst>
           </p:nvPr>
         </p:nvGraphicFramePr>
         <p:xfrm>
-          <a:off x="143555" y="1166637"/>
-          <a:ext cx="7193787" cy="3390280"/>
+          <a:off x="279608" y="1166637"/>
+          <a:ext cx="7057734" cy="3390280"/>
         </p:xfrm>
         <a:graphic>
           <a:graphicData uri="http://schemas.openxmlformats.org/drawingml/2006/table">
@@ -8020,21 +8056,21 @@
                 <a:tableStyleId>{F5AB1C69-6EDB-4FF4-983F-18BD219EF322}</a:tableStyleId>
               </a:tblPr>
               <a:tblGrid>
-                <a:gridCol w="691710">
+                <a:gridCol w="678628">
                   <a:extLst>
                     <a:ext uri="{9D8B030D-6E8A-4147-A177-3AD203B41FA5}">
                       <a16:colId xmlns:a16="http://schemas.microsoft.com/office/drawing/2014/main" val="2427186849"/>
                     </a:ext>
                   </a:extLst>
                 </a:gridCol>
-                <a:gridCol w="3142568">
+                <a:gridCol w="3083134">
                   <a:extLst>
                     <a:ext uri="{9D8B030D-6E8A-4147-A177-3AD203B41FA5}">
                       <a16:colId xmlns:a16="http://schemas.microsoft.com/office/drawing/2014/main" val="1028123022"/>
                     </a:ext>
                   </a:extLst>
                 </a:gridCol>
-                <a:gridCol w="3359509">
+                <a:gridCol w="3295972">
                   <a:extLst>
                     <a:ext uri="{9D8B030D-6E8A-4147-A177-3AD203B41FA5}">
                       <a16:colId xmlns:a16="http://schemas.microsoft.com/office/drawing/2014/main" val="2135052757"/>
@@ -8627,7 +8663,7 @@
                         </a:spcAft>
                       </a:pPr>
                       <a:r>
-                        <a:rPr lang="en-US" sz="1200">
+                        <a:rPr lang="en-US" sz="1200" dirty="0">
                           <a:solidFill>
                             <a:schemeClr val="tx1"/>
                           </a:solidFill>
@@ -8637,7 +8673,7 @@
                         </a:rPr>
                         <a:t>Eng. Abdullah Al Mamun (Certification Expert)</a:t>
                       </a:r>
-                      <a:endParaRPr lang="en-US" sz="1200">
+                      <a:endParaRPr lang="en-US" sz="1200" dirty="0">
                         <a:solidFill>
                           <a:schemeClr val="tx1"/>
                         </a:solidFill>
@@ -10132,12 +10168,17 @@
         </p:blipFill>
         <p:spPr>
           <a:xfrm>
-            <a:off x="4572000" y="2635506"/>
-            <a:ext cx="3970330" cy="1855893"/>
+            <a:off x="4572000" y="1960930"/>
+            <a:ext cx="3970330" cy="2402957"/>
           </a:xfrm>
           <a:prstGeom prst="rect">
             <a:avLst/>
           </a:prstGeom>
+          <a:ln>
+            <a:solidFill>
+              <a:schemeClr val="tx1"/>
+            </a:solidFill>
+          </a:ln>
         </p:spPr>
       </p:pic>
     </p:spTree>
@@ -10426,7 +10467,7 @@
         </p:blipFill>
         <p:spPr>
           <a:xfrm>
-            <a:off x="719630" y="1640087"/>
+            <a:off x="791562" y="1640087"/>
             <a:ext cx="3352800" cy="2514600"/>
           </a:xfrm>
           <a:prstGeom prst="rect">
@@ -11500,7 +11541,7 @@
           <p:nvPr>
             <p:extLst>
               <p:ext uri="{D42A27DB-BD31-4B8C-83A1-F6EECF244321}">
-                <p14:modId xmlns:p14="http://schemas.microsoft.com/office/powerpoint/2010/main" val="3146688051"/>
+                <p14:modId xmlns:p14="http://schemas.microsoft.com/office/powerpoint/2010/main" val="3574874712"/>
               </p:ext>
             </p:extLst>
           </p:nvPr>
@@ -11834,7 +11875,7 @@
                         </a:spcAft>
                       </a:pPr>
                       <a:r>
-                        <a:rPr lang="en-US" sz="1400">
+                        <a:rPr lang="en-US" sz="1400" dirty="0">
                           <a:solidFill>
                             <a:schemeClr val="tx1"/>
                           </a:solidFill>
@@ -11845,7 +11886,7 @@
                         <a:t>4</a:t>
                       </a:r>
                       <a:r>
-                        <a:rPr lang="en-US" sz="1400" baseline="30000">
+                        <a:rPr lang="en-US" sz="1400" baseline="30000" dirty="0">
                           <a:solidFill>
                             <a:schemeClr val="tx1"/>
                           </a:solidFill>
@@ -11856,17 +11897,17 @@
                         <a:t>th</a:t>
                       </a:r>
                       <a:r>
-                        <a:rPr lang="en-US" sz="1400">
-                          <a:solidFill>
-                            <a:schemeClr val="tx1"/>
-                          </a:solidFill>
-                          <a:effectLst/>
-                          <a:latin typeface="Times New Roman" panose="02020603050405020304" pitchFamily="18" charset="0"/>
-                          <a:cs typeface="Times New Roman" panose="02020603050405020304" pitchFamily="18" charset="0"/>
-                        </a:rPr>
-                        <a:t> Industrial revolution</a:t>
-                      </a:r>
-                      <a:endParaRPr lang="en-US" sz="1800">
+                        <a:rPr lang="en-US" sz="1400" dirty="0">
+                          <a:solidFill>
+                            <a:schemeClr val="tx1"/>
+                          </a:solidFill>
+                          <a:effectLst/>
+                          <a:latin typeface="Times New Roman" panose="02020603050405020304" pitchFamily="18" charset="0"/>
+                          <a:cs typeface="Times New Roman" panose="02020603050405020304" pitchFamily="18" charset="0"/>
+                        </a:rPr>
+                        <a:t> Industrial Revolution</a:t>
+                      </a:r>
+                      <a:endParaRPr lang="en-US" sz="1800" dirty="0">
                         <a:solidFill>
                           <a:schemeClr val="tx1"/>
                         </a:solidFill>
@@ -12016,7 +12057,7 @@
                           <a:latin typeface="Times New Roman" panose="02020603050405020304" pitchFamily="18" charset="0"/>
                           <a:cs typeface="Times New Roman" panose="02020603050405020304" pitchFamily="18" charset="0"/>
                         </a:rPr>
-                        <a:t> Industrial revolution</a:t>
+                        <a:t> Industrial Revolution</a:t>
                       </a:r>
                       <a:endParaRPr lang="en-US" sz="1800" dirty="0">
                         <a:solidFill>
@@ -12754,8 +12795,8 @@
         </p:nvSpPr>
         <p:spPr>
           <a:xfrm>
-            <a:off x="1059785" y="281175"/>
-            <a:ext cx="6719020" cy="610820"/>
+            <a:off x="1212489" y="265613"/>
+            <a:ext cx="6719020" cy="474202"/>
           </a:xfrm>
         </p:spPr>
         <p:txBody>
@@ -12798,13 +12839,13 @@
           <p:nvPr>
             <p:extLst>
               <p:ext uri="{D42A27DB-BD31-4B8C-83A1-F6EECF244321}">
-                <p14:modId xmlns:p14="http://schemas.microsoft.com/office/powerpoint/2010/main" val="3123024709"/>
+                <p14:modId xmlns:p14="http://schemas.microsoft.com/office/powerpoint/2010/main" val="3160837784"/>
               </p:ext>
             </p:extLst>
           </p:nvPr>
         </p:nvGraphicFramePr>
         <p:xfrm>
-          <a:off x="1212489" y="1044700"/>
+          <a:off x="1212489" y="1119199"/>
           <a:ext cx="6719020" cy="3194685"/>
         </p:xfrm>
         <a:graphic>
@@ -14444,6 +14485,92 @@
           </a:prstGeom>
         </p:spPr>
       </p:pic>
+      <p:sp>
+        <p:nvSpPr>
+          <p:cNvPr id="7" name="Title 1">
+            <a:extLst>
+              <a:ext uri="{FF2B5EF4-FFF2-40B4-BE49-F238E27FC236}">
+                <a16:creationId xmlns:a16="http://schemas.microsoft.com/office/drawing/2014/main" id="{83431FA1-0CB6-468B-A6F0-C8271A5FC011}"/>
+              </a:ext>
+            </a:extLst>
+          </p:cNvPr>
+          <p:cNvSpPr txBox="1">
+            <a:spLocks/>
+          </p:cNvSpPr>
+          <p:nvPr/>
+        </p:nvSpPr>
+        <p:spPr>
+          <a:xfrm>
+            <a:off x="7914808" y="739815"/>
+            <a:ext cx="1068937" cy="201678"/>
+          </a:xfrm>
+          <a:prstGeom prst="rect">
+            <a:avLst/>
+          </a:prstGeom>
+        </p:spPr>
+        <p:txBody>
+          <a:bodyPr vert="horz" lIns="91440" tIns="45720" rIns="91440" bIns="45720" rtlCol="0" anchor="ctr">
+            <a:noAutofit/>
+          </a:bodyPr>
+          <a:lstStyle>
+            <a:lvl1pPr algn="l" defTabSz="914400" rtl="0" eaLnBrk="1" latinLnBrk="0" hangingPunct="1">
+              <a:spcBef>
+                <a:spcPct val="0"/>
+              </a:spcBef>
+              <a:buNone/>
+              <a:defRPr sz="3600" kern="1200">
+                <a:solidFill>
+                  <a:schemeClr val="bg1"/>
+                </a:solidFill>
+                <a:effectLst>
+                  <a:outerShdw blurRad="50800" dist="38100" dir="2700000" algn="tl" rotWithShape="0">
+                    <a:prstClr val="black">
+                      <a:alpha val="40000"/>
+                    </a:prstClr>
+                  </a:outerShdw>
+                </a:effectLst>
+                <a:latin typeface="+mj-lt"/>
+                <a:ea typeface="+mj-ea"/>
+                <a:cs typeface="+mj-cs"/>
+              </a:defRPr>
+            </a:lvl1pPr>
+          </a:lstStyle>
+          <a:p>
+            <a:pPr algn="ctr"/>
+            <a:r>
+              <a:rPr lang="en-US" sz="1200" b="1" dirty="0">
+                <a:solidFill>
+                  <a:srgbClr val="C00000"/>
+                </a:solidFill>
+                <a:effectLst>
+                  <a:outerShdw blurRad="38100" dist="38100" dir="2700000" algn="tl">
+                    <a:srgbClr val="000000">
+                      <a:alpha val="43137"/>
+                    </a:srgbClr>
+                  </a:outerShdw>
+                </a:effectLst>
+                <a:latin typeface="Times New Roman" panose="02020603050405020304" pitchFamily="18" charset="0"/>
+                <a:cs typeface="Times New Roman" panose="02020603050405020304" pitchFamily="18" charset="0"/>
+              </a:rPr>
+              <a:t>Continue…</a:t>
+            </a:r>
+            <a:endParaRPr lang="en-US" sz="1200" dirty="0">
+              <a:solidFill>
+                <a:srgbClr val="C00000"/>
+              </a:solidFill>
+              <a:effectLst>
+                <a:outerShdw blurRad="38100" dist="38100" dir="2700000" algn="tl">
+                  <a:srgbClr val="000000">
+                    <a:alpha val="43137"/>
+                  </a:srgbClr>
+                </a:outerShdw>
+              </a:effectLst>
+              <a:latin typeface="Times New Roman" panose="02020603050405020304" pitchFamily="18" charset="0"/>
+              <a:cs typeface="Times New Roman" panose="02020603050405020304" pitchFamily="18" charset="0"/>
+            </a:endParaRPr>
+          </a:p>
+        </p:txBody>
+      </p:sp>
     </p:spTree>
     <p:extLst>
       <p:ext uri="{BB962C8B-B14F-4D97-AF65-F5344CB8AC3E}">
@@ -14489,8 +14616,8 @@
         </p:nvSpPr>
         <p:spPr>
           <a:xfrm>
-            <a:off x="1059785" y="281175"/>
-            <a:ext cx="6719020" cy="610820"/>
+            <a:off x="1212487" y="290881"/>
+            <a:ext cx="6719020" cy="474202"/>
           </a:xfrm>
         </p:spPr>
         <p:txBody>
@@ -16433,6 +16560,92 @@
           </a:prstGeom>
         </p:spPr>
       </p:pic>
+      <p:sp>
+        <p:nvSpPr>
+          <p:cNvPr id="7" name="Title 1">
+            <a:extLst>
+              <a:ext uri="{FF2B5EF4-FFF2-40B4-BE49-F238E27FC236}">
+                <a16:creationId xmlns:a16="http://schemas.microsoft.com/office/drawing/2014/main" id="{BC778925-7B62-4FB2-9642-8DD54F93AEF4}"/>
+              </a:ext>
+            </a:extLst>
+          </p:cNvPr>
+          <p:cNvSpPr txBox="1">
+            <a:spLocks/>
+          </p:cNvSpPr>
+          <p:nvPr/>
+        </p:nvSpPr>
+        <p:spPr>
+          <a:xfrm>
+            <a:off x="7931507" y="879565"/>
+            <a:ext cx="1068937" cy="165135"/>
+          </a:xfrm>
+          <a:prstGeom prst="rect">
+            <a:avLst/>
+          </a:prstGeom>
+        </p:spPr>
+        <p:txBody>
+          <a:bodyPr vert="horz" lIns="91440" tIns="45720" rIns="91440" bIns="45720" rtlCol="0" anchor="ctr">
+            <a:noAutofit/>
+          </a:bodyPr>
+          <a:lstStyle>
+            <a:lvl1pPr algn="l" defTabSz="914400" rtl="0" eaLnBrk="1" latinLnBrk="0" hangingPunct="1">
+              <a:spcBef>
+                <a:spcPct val="0"/>
+              </a:spcBef>
+              <a:buNone/>
+              <a:defRPr sz="3600" kern="1200">
+                <a:solidFill>
+                  <a:schemeClr val="bg1"/>
+                </a:solidFill>
+                <a:effectLst>
+                  <a:outerShdw blurRad="50800" dist="38100" dir="2700000" algn="tl" rotWithShape="0">
+                    <a:prstClr val="black">
+                      <a:alpha val="40000"/>
+                    </a:prstClr>
+                  </a:outerShdw>
+                </a:effectLst>
+                <a:latin typeface="+mj-lt"/>
+                <a:ea typeface="+mj-ea"/>
+                <a:cs typeface="+mj-cs"/>
+              </a:defRPr>
+            </a:lvl1pPr>
+          </a:lstStyle>
+          <a:p>
+            <a:pPr algn="ctr"/>
+            <a:r>
+              <a:rPr lang="en-US" sz="1200" b="1" dirty="0">
+                <a:solidFill>
+                  <a:srgbClr val="C00000"/>
+                </a:solidFill>
+                <a:effectLst>
+                  <a:outerShdw blurRad="38100" dist="38100" dir="2700000" algn="tl">
+                    <a:srgbClr val="000000">
+                      <a:alpha val="43137"/>
+                    </a:srgbClr>
+                  </a:outerShdw>
+                </a:effectLst>
+                <a:latin typeface="Times New Roman" panose="02020603050405020304" pitchFamily="18" charset="0"/>
+                <a:cs typeface="Times New Roman" panose="02020603050405020304" pitchFamily="18" charset="0"/>
+              </a:rPr>
+              <a:t>Continue…</a:t>
+            </a:r>
+            <a:endParaRPr lang="en-US" sz="1200" dirty="0">
+              <a:solidFill>
+                <a:srgbClr val="C00000"/>
+              </a:solidFill>
+              <a:effectLst>
+                <a:outerShdw blurRad="38100" dist="38100" dir="2700000" algn="tl">
+                  <a:srgbClr val="000000">
+                    <a:alpha val="43137"/>
+                  </a:srgbClr>
+                </a:outerShdw>
+              </a:effectLst>
+              <a:latin typeface="Times New Roman" panose="02020603050405020304" pitchFamily="18" charset="0"/>
+              <a:cs typeface="Times New Roman" panose="02020603050405020304" pitchFamily="18" charset="0"/>
+            </a:endParaRPr>
+          </a:p>
+        </p:txBody>
+      </p:sp>
     </p:spTree>
     <p:extLst>
       <p:ext uri="{BB962C8B-B14F-4D97-AF65-F5344CB8AC3E}">
@@ -16478,8 +16691,8 @@
         </p:nvSpPr>
         <p:spPr>
           <a:xfrm>
-            <a:off x="1059785" y="281175"/>
-            <a:ext cx="6719020" cy="610820"/>
+            <a:off x="1212490" y="281656"/>
+            <a:ext cx="6719020" cy="474202"/>
           </a:xfrm>
         </p:spPr>
         <p:txBody>
@@ -17834,6 +18047,92 @@
           </a:prstGeom>
         </p:spPr>
       </p:pic>
+      <p:sp>
+        <p:nvSpPr>
+          <p:cNvPr id="7" name="Title 1">
+            <a:extLst>
+              <a:ext uri="{FF2B5EF4-FFF2-40B4-BE49-F238E27FC236}">
+                <a16:creationId xmlns:a16="http://schemas.microsoft.com/office/drawing/2014/main" id="{3B1299E6-5C14-43FC-8878-8AD226A52B8B}"/>
+              </a:ext>
+            </a:extLst>
+          </p:cNvPr>
+          <p:cNvSpPr txBox="1">
+            <a:spLocks/>
+          </p:cNvSpPr>
+          <p:nvPr/>
+        </p:nvSpPr>
+        <p:spPr>
+          <a:xfrm>
+            <a:off x="7931507" y="1032270"/>
+            <a:ext cx="1068937" cy="165133"/>
+          </a:xfrm>
+          <a:prstGeom prst="rect">
+            <a:avLst/>
+          </a:prstGeom>
+        </p:spPr>
+        <p:txBody>
+          <a:bodyPr vert="horz" lIns="91440" tIns="45720" rIns="91440" bIns="45720" rtlCol="0" anchor="ctr">
+            <a:noAutofit/>
+          </a:bodyPr>
+          <a:lstStyle>
+            <a:lvl1pPr algn="l" defTabSz="914400" rtl="0" eaLnBrk="1" latinLnBrk="0" hangingPunct="1">
+              <a:spcBef>
+                <a:spcPct val="0"/>
+              </a:spcBef>
+              <a:buNone/>
+              <a:defRPr sz="3600" kern="1200">
+                <a:solidFill>
+                  <a:schemeClr val="bg1"/>
+                </a:solidFill>
+                <a:effectLst>
+                  <a:outerShdw blurRad="50800" dist="38100" dir="2700000" algn="tl" rotWithShape="0">
+                    <a:prstClr val="black">
+                      <a:alpha val="40000"/>
+                    </a:prstClr>
+                  </a:outerShdw>
+                </a:effectLst>
+                <a:latin typeface="+mj-lt"/>
+                <a:ea typeface="+mj-ea"/>
+                <a:cs typeface="+mj-cs"/>
+              </a:defRPr>
+            </a:lvl1pPr>
+          </a:lstStyle>
+          <a:p>
+            <a:pPr algn="ctr"/>
+            <a:r>
+              <a:rPr lang="en-US" sz="1200" b="1" dirty="0">
+                <a:solidFill>
+                  <a:srgbClr val="C00000"/>
+                </a:solidFill>
+                <a:effectLst>
+                  <a:outerShdw blurRad="38100" dist="38100" dir="2700000" algn="tl">
+                    <a:srgbClr val="000000">
+                      <a:alpha val="43137"/>
+                    </a:srgbClr>
+                  </a:outerShdw>
+                </a:effectLst>
+                <a:latin typeface="Times New Roman" panose="02020603050405020304" pitchFamily="18" charset="0"/>
+                <a:cs typeface="Times New Roman" panose="02020603050405020304" pitchFamily="18" charset="0"/>
+              </a:rPr>
+              <a:t>Continue…</a:t>
+            </a:r>
+            <a:endParaRPr lang="en-US" sz="1200" dirty="0">
+              <a:solidFill>
+                <a:srgbClr val="C00000"/>
+              </a:solidFill>
+              <a:effectLst>
+                <a:outerShdw blurRad="38100" dist="38100" dir="2700000" algn="tl">
+                  <a:srgbClr val="000000">
+                    <a:alpha val="43137"/>
+                  </a:srgbClr>
+                </a:outerShdw>
+              </a:effectLst>
+              <a:latin typeface="Times New Roman" panose="02020603050405020304" pitchFamily="18" charset="0"/>
+              <a:cs typeface="Times New Roman" panose="02020603050405020304" pitchFamily="18" charset="0"/>
+            </a:endParaRPr>
+          </a:p>
+        </p:txBody>
+      </p:sp>
     </p:spTree>
     <p:extLst>
       <p:ext uri="{BB962C8B-B14F-4D97-AF65-F5344CB8AC3E}">
@@ -17965,24 +18264,142 @@
                 <a:ea typeface="Calibri" panose="020F0502020204030204" pitchFamily="34" charset="0"/>
                 <a:cs typeface="Times New Roman" panose="02020603050405020304" pitchFamily="18" charset="0"/>
               </a:rPr>
-              <a:t>Bangladesh Jail is working to develop the theme “</a:t>
+              <a:t>Bangladesh Jail is working to develop the theme </a:t>
             </a:r>
             <a:r>
-              <a:rPr lang="en-US" sz="1200" dirty="0" err="1">
+              <a:rPr lang="en-US" sz="1200" dirty="0">
+                <a:effectLst>
+                  <a:outerShdw blurRad="38100" dist="38100" dir="2700000" algn="tl">
+                    <a:srgbClr val="000000">
+                      <a:alpha val="43137"/>
+                    </a:srgbClr>
+                  </a:outerShdw>
+                </a:effectLst>
                 <a:latin typeface="Times New Roman" panose="02020603050405020304" pitchFamily="18" charset="0"/>
                 <a:ea typeface="Calibri" panose="020F0502020204030204" pitchFamily="34" charset="0"/>
                 <a:cs typeface="Times New Roman" panose="02020603050405020304" pitchFamily="18" charset="0"/>
               </a:rPr>
-              <a:t>R</a:t>
+              <a:t>“</a:t>
             </a:r>
             <a:r>
               <a:rPr lang="en-US" sz="1200" dirty="0" err="1">
-                <a:effectLst/>
+                <a:effectLst>
+                  <a:outerShdw blurRad="38100" dist="38100" dir="2700000" algn="tl">
+                    <a:srgbClr val="000000">
+                      <a:alpha val="43137"/>
+                    </a:srgbClr>
+                  </a:outerShdw>
+                </a:effectLst>
                 <a:latin typeface="Times New Roman" panose="02020603050405020304" pitchFamily="18" charset="0"/>
                 <a:ea typeface="Calibri" panose="020F0502020204030204" pitchFamily="34" charset="0"/>
                 <a:cs typeface="Times New Roman" panose="02020603050405020304" pitchFamily="18" charset="0"/>
               </a:rPr>
-              <a:t>akhibo</a:t>
+              <a:t>Rakhibo</a:t>
+            </a:r>
+            <a:r>
+              <a:rPr lang="en-US" sz="1200" dirty="0">
+                <a:effectLst>
+                  <a:outerShdw blurRad="38100" dist="38100" dir="2700000" algn="tl">
+                    <a:srgbClr val="000000">
+                      <a:alpha val="43137"/>
+                    </a:srgbClr>
+                  </a:outerShdw>
+                </a:effectLst>
+                <a:latin typeface="Times New Roman" panose="02020603050405020304" pitchFamily="18" charset="0"/>
+                <a:ea typeface="Calibri" panose="020F0502020204030204" pitchFamily="34" charset="0"/>
+                <a:cs typeface="Times New Roman" panose="02020603050405020304" pitchFamily="18" charset="0"/>
+              </a:rPr>
+              <a:t> </a:t>
+            </a:r>
+            <a:r>
+              <a:rPr lang="en-US" sz="1200" dirty="0" err="1">
+                <a:effectLst>
+                  <a:outerShdw blurRad="38100" dist="38100" dir="2700000" algn="tl">
+                    <a:srgbClr val="000000">
+                      <a:alpha val="43137"/>
+                    </a:srgbClr>
+                  </a:outerShdw>
+                </a:effectLst>
+                <a:latin typeface="Times New Roman" panose="02020603050405020304" pitchFamily="18" charset="0"/>
+                <a:ea typeface="Calibri" panose="020F0502020204030204" pitchFamily="34" charset="0"/>
+                <a:cs typeface="Times New Roman" panose="02020603050405020304" pitchFamily="18" charset="0"/>
+              </a:rPr>
+              <a:t>Nirapad</a:t>
+            </a:r>
+            <a:r>
+              <a:rPr lang="en-US" sz="1200" dirty="0">
+                <a:effectLst>
+                  <a:outerShdw blurRad="38100" dist="38100" dir="2700000" algn="tl">
+                    <a:srgbClr val="000000">
+                      <a:alpha val="43137"/>
+                    </a:srgbClr>
+                  </a:outerShdw>
+                </a:effectLst>
+                <a:latin typeface="Times New Roman" panose="02020603050405020304" pitchFamily="18" charset="0"/>
+                <a:ea typeface="Calibri" panose="020F0502020204030204" pitchFamily="34" charset="0"/>
+                <a:cs typeface="Times New Roman" panose="02020603050405020304" pitchFamily="18" charset="0"/>
+              </a:rPr>
+              <a:t>, </a:t>
+            </a:r>
+            <a:r>
+              <a:rPr lang="en-US" sz="1200" dirty="0" err="1">
+                <a:effectLst>
+                  <a:outerShdw blurRad="38100" dist="38100" dir="2700000" algn="tl">
+                    <a:srgbClr val="000000">
+                      <a:alpha val="43137"/>
+                    </a:srgbClr>
+                  </a:outerShdw>
+                </a:effectLst>
+                <a:latin typeface="Times New Roman" panose="02020603050405020304" pitchFamily="18" charset="0"/>
+                <a:ea typeface="Calibri" panose="020F0502020204030204" pitchFamily="34" charset="0"/>
+                <a:cs typeface="Times New Roman" panose="02020603050405020304" pitchFamily="18" charset="0"/>
+              </a:rPr>
+              <a:t>Dekhabo</a:t>
+            </a:r>
+            <a:r>
+              <a:rPr lang="en-US" sz="1200" dirty="0">
+                <a:effectLst>
+                  <a:outerShdw blurRad="38100" dist="38100" dir="2700000" algn="tl">
+                    <a:srgbClr val="000000">
+                      <a:alpha val="43137"/>
+                    </a:srgbClr>
+                  </a:outerShdw>
+                </a:effectLst>
+                <a:latin typeface="Times New Roman" panose="02020603050405020304" pitchFamily="18" charset="0"/>
+                <a:ea typeface="Calibri" panose="020F0502020204030204" pitchFamily="34" charset="0"/>
+                <a:cs typeface="Times New Roman" panose="02020603050405020304" pitchFamily="18" charset="0"/>
+              </a:rPr>
+              <a:t> </a:t>
+            </a:r>
+            <a:r>
+              <a:rPr lang="en-US" sz="1200" dirty="0" err="1">
+                <a:effectLst>
+                  <a:outerShdw blurRad="38100" dist="38100" dir="2700000" algn="tl">
+                    <a:srgbClr val="000000">
+                      <a:alpha val="43137"/>
+                    </a:srgbClr>
+                  </a:outerShdw>
+                </a:effectLst>
+                <a:latin typeface="Times New Roman" panose="02020603050405020304" pitchFamily="18" charset="0"/>
+                <a:ea typeface="Calibri" panose="020F0502020204030204" pitchFamily="34" charset="0"/>
+                <a:cs typeface="Times New Roman" panose="02020603050405020304" pitchFamily="18" charset="0"/>
+              </a:rPr>
+              <a:t>Alor</a:t>
+            </a:r>
+            <a:r>
+              <a:rPr lang="en-US" sz="1200" dirty="0">
+                <a:effectLst>
+                  <a:outerShdw blurRad="38100" dist="38100" dir="2700000" algn="tl">
+                    <a:srgbClr val="000000">
+                      <a:alpha val="43137"/>
+                    </a:srgbClr>
+                  </a:outerShdw>
+                </a:effectLst>
+                <a:latin typeface="Times New Roman" panose="02020603050405020304" pitchFamily="18" charset="0"/>
+                <a:ea typeface="Calibri" panose="020F0502020204030204" pitchFamily="34" charset="0"/>
+                <a:cs typeface="Times New Roman" panose="02020603050405020304" pitchFamily="18" charset="0"/>
+              </a:rPr>
+              <a:t> Poth”</a:t>
             </a:r>
             <a:r>
               <a:rPr lang="en-US" sz="1200" dirty="0">
@@ -17991,61 +18408,7 @@
                 <a:ea typeface="Calibri" panose="020F0502020204030204" pitchFamily="34" charset="0"/>
                 <a:cs typeface="Times New Roman" panose="02020603050405020304" pitchFamily="18" charset="0"/>
               </a:rPr>
-              <a:t> </a:t>
-            </a:r>
-            <a:r>
-              <a:rPr lang="en-US" sz="1200" dirty="0" err="1">
-                <a:effectLst/>
-                <a:latin typeface="Times New Roman" panose="02020603050405020304" pitchFamily="18" charset="0"/>
-                <a:ea typeface="Calibri" panose="020F0502020204030204" pitchFamily="34" charset="0"/>
-                <a:cs typeface="Times New Roman" panose="02020603050405020304" pitchFamily="18" charset="0"/>
-              </a:rPr>
-              <a:t>Nirapad</a:t>
-            </a:r>
-            <a:r>
-              <a:rPr lang="en-US" sz="1200" dirty="0">
-                <a:effectLst/>
-                <a:latin typeface="Times New Roman" panose="02020603050405020304" pitchFamily="18" charset="0"/>
-                <a:ea typeface="Calibri" panose="020F0502020204030204" pitchFamily="34" charset="0"/>
-                <a:cs typeface="Times New Roman" panose="02020603050405020304" pitchFamily="18" charset="0"/>
-              </a:rPr>
-              <a:t>, </a:t>
-            </a:r>
-            <a:r>
-              <a:rPr lang="en-US" sz="1200" dirty="0" err="1">
-                <a:effectLst/>
-                <a:latin typeface="Times New Roman" panose="02020603050405020304" pitchFamily="18" charset="0"/>
-                <a:ea typeface="Calibri" panose="020F0502020204030204" pitchFamily="34" charset="0"/>
-                <a:cs typeface="Times New Roman" panose="02020603050405020304" pitchFamily="18" charset="0"/>
-              </a:rPr>
-              <a:t>Dekhabo</a:t>
-            </a:r>
-            <a:r>
-              <a:rPr lang="en-US" sz="1200" dirty="0">
-                <a:effectLst/>
-                <a:latin typeface="Times New Roman" panose="02020603050405020304" pitchFamily="18" charset="0"/>
-                <a:ea typeface="Calibri" panose="020F0502020204030204" pitchFamily="34" charset="0"/>
-                <a:cs typeface="Times New Roman" panose="02020603050405020304" pitchFamily="18" charset="0"/>
-              </a:rPr>
-              <a:t> </a:t>
-            </a:r>
-            <a:r>
-              <a:rPr lang="en-US" sz="1200" dirty="0" err="1">
-                <a:effectLst/>
-                <a:latin typeface="Times New Roman" panose="02020603050405020304" pitchFamily="18" charset="0"/>
-                <a:ea typeface="Calibri" panose="020F0502020204030204" pitchFamily="34" charset="0"/>
-                <a:cs typeface="Times New Roman" panose="02020603050405020304" pitchFamily="18" charset="0"/>
-              </a:rPr>
-              <a:t>Alor</a:t>
-            </a:r>
-            <a:r>
-              <a:rPr lang="en-US" sz="1200" dirty="0">
-                <a:effectLst/>
-                <a:latin typeface="Times New Roman" panose="02020603050405020304" pitchFamily="18" charset="0"/>
-                <a:ea typeface="Calibri" panose="020F0502020204030204" pitchFamily="34" charset="0"/>
-                <a:cs typeface="Times New Roman" panose="02020603050405020304" pitchFamily="18" charset="0"/>
-              </a:rPr>
-              <a:t> Poth” for the prisoners after release. The different training programs are already running in different trades with Bangladesh Jail. However, the modern and social activities related training program is more convenient and useful for prisoners.</a:t>
+              <a:t> for the prisoners after release. The different training programs are already running in different trades with Bangladesh Jail. However, the modern and social activities related training program is more convenient and useful for prisoners.</a:t>
             </a:r>
           </a:p>
           <a:p>
@@ -18236,8 +18599,8 @@
         </p:nvSpPr>
         <p:spPr>
           <a:xfrm>
-            <a:off x="1059785" y="281175"/>
-            <a:ext cx="6719020" cy="610820"/>
+            <a:off x="1212490" y="312856"/>
+            <a:ext cx="6719020" cy="474202"/>
           </a:xfrm>
         </p:spPr>
         <p:txBody>
@@ -18280,7 +18643,7 @@
           <p:nvPr>
             <p:extLst>
               <p:ext uri="{D42A27DB-BD31-4B8C-83A1-F6EECF244321}">
-                <p14:modId xmlns:p14="http://schemas.microsoft.com/office/powerpoint/2010/main" val="2351603514"/>
+                <p14:modId xmlns:p14="http://schemas.microsoft.com/office/powerpoint/2010/main" val="3909382941"/>
               </p:ext>
             </p:extLst>
           </p:nvPr>
@@ -19008,17 +19371,17 @@
                         </a:spcAft>
                       </a:pPr>
                       <a:r>
-                        <a:rPr lang="en-US" sz="1400">
-                          <a:solidFill>
-                            <a:schemeClr val="tx1"/>
-                          </a:solidFill>
-                          <a:effectLst/>
-                          <a:latin typeface="Times New Roman" panose="02020603050405020304" pitchFamily="18" charset="0"/>
-                          <a:cs typeface="Times New Roman" panose="02020603050405020304" pitchFamily="18" charset="0"/>
-                        </a:rPr>
-                        <a:t>TV Talk show, Rally &amp; Campaign</a:t>
-                      </a:r>
-                      <a:endParaRPr lang="en-US" sz="1800">
+                        <a:rPr lang="en-US" sz="1400" dirty="0">
+                          <a:solidFill>
+                            <a:schemeClr val="tx1"/>
+                          </a:solidFill>
+                          <a:effectLst/>
+                          <a:latin typeface="Times New Roman" panose="02020603050405020304" pitchFamily="18" charset="0"/>
+                          <a:cs typeface="Times New Roman" panose="02020603050405020304" pitchFamily="18" charset="0"/>
+                        </a:rPr>
+                        <a:t>TV Talk Show, Rally &amp; Campaign</a:t>
+                      </a:r>
+                      <a:endParaRPr lang="en-US" sz="1800" dirty="0">
                         <a:solidFill>
                           <a:schemeClr val="tx1"/>
                         </a:solidFill>
@@ -19155,17 +19518,17 @@
                         </a:spcAft>
                       </a:pPr>
                       <a:r>
-                        <a:rPr lang="en-US" sz="1400">
-                          <a:solidFill>
-                            <a:schemeClr val="tx1"/>
-                          </a:solidFill>
-                          <a:effectLst/>
-                          <a:latin typeface="Times New Roman" panose="02020603050405020304" pitchFamily="18" charset="0"/>
-                          <a:cs typeface="Times New Roman" panose="02020603050405020304" pitchFamily="18" charset="0"/>
-                        </a:rPr>
-                        <a:t>Work shop &amp; Seminar</a:t>
-                      </a:r>
-                      <a:endParaRPr lang="en-US" sz="1800">
+                        <a:rPr lang="en-US" sz="1400" dirty="0">
+                          <a:solidFill>
+                            <a:schemeClr val="tx1"/>
+                          </a:solidFill>
+                          <a:effectLst/>
+                          <a:latin typeface="Times New Roman" panose="02020603050405020304" pitchFamily="18" charset="0"/>
+                          <a:cs typeface="Times New Roman" panose="02020603050405020304" pitchFamily="18" charset="0"/>
+                        </a:rPr>
+                        <a:t>Work Shop &amp; Seminar</a:t>
+                      </a:r>
+                      <a:endParaRPr lang="en-US" sz="1800" dirty="0">
                         <a:solidFill>
                           <a:schemeClr val="tx1"/>
                         </a:solidFill>
@@ -19592,6 +19955,92 @@
           </a:prstGeom>
         </p:spPr>
       </p:pic>
+      <p:sp>
+        <p:nvSpPr>
+          <p:cNvPr id="7" name="Title 1">
+            <a:extLst>
+              <a:ext uri="{FF2B5EF4-FFF2-40B4-BE49-F238E27FC236}">
+                <a16:creationId xmlns:a16="http://schemas.microsoft.com/office/drawing/2014/main" id="{73E65C06-02D4-49C3-9872-D80EEADA6B07}"/>
+              </a:ext>
+            </a:extLst>
+          </p:cNvPr>
+          <p:cNvSpPr txBox="1">
+            <a:spLocks/>
+          </p:cNvSpPr>
+          <p:nvPr/>
+        </p:nvSpPr>
+        <p:spPr>
+          <a:xfrm>
+            <a:off x="7931507" y="1197405"/>
+            <a:ext cx="1068937" cy="152705"/>
+          </a:xfrm>
+          <a:prstGeom prst="rect">
+            <a:avLst/>
+          </a:prstGeom>
+        </p:spPr>
+        <p:txBody>
+          <a:bodyPr vert="horz" lIns="91440" tIns="45720" rIns="91440" bIns="45720" rtlCol="0" anchor="ctr">
+            <a:noAutofit/>
+          </a:bodyPr>
+          <a:lstStyle>
+            <a:lvl1pPr algn="l" defTabSz="914400" rtl="0" eaLnBrk="1" latinLnBrk="0" hangingPunct="1">
+              <a:spcBef>
+                <a:spcPct val="0"/>
+              </a:spcBef>
+              <a:buNone/>
+              <a:defRPr sz="3600" kern="1200">
+                <a:solidFill>
+                  <a:schemeClr val="bg1"/>
+                </a:solidFill>
+                <a:effectLst>
+                  <a:outerShdw blurRad="50800" dist="38100" dir="2700000" algn="tl" rotWithShape="0">
+                    <a:prstClr val="black">
+                      <a:alpha val="40000"/>
+                    </a:prstClr>
+                  </a:outerShdw>
+                </a:effectLst>
+                <a:latin typeface="+mj-lt"/>
+                <a:ea typeface="+mj-ea"/>
+                <a:cs typeface="+mj-cs"/>
+              </a:defRPr>
+            </a:lvl1pPr>
+          </a:lstStyle>
+          <a:p>
+            <a:pPr algn="ctr"/>
+            <a:r>
+              <a:rPr lang="en-US" sz="1200" b="1" dirty="0">
+                <a:solidFill>
+                  <a:srgbClr val="C00000"/>
+                </a:solidFill>
+                <a:effectLst>
+                  <a:outerShdw blurRad="38100" dist="38100" dir="2700000" algn="tl">
+                    <a:srgbClr val="000000">
+                      <a:alpha val="43137"/>
+                    </a:srgbClr>
+                  </a:outerShdw>
+                </a:effectLst>
+                <a:latin typeface="Times New Roman" panose="02020603050405020304" pitchFamily="18" charset="0"/>
+                <a:cs typeface="Times New Roman" panose="02020603050405020304" pitchFamily="18" charset="0"/>
+              </a:rPr>
+              <a:t>Continue…</a:t>
+            </a:r>
+            <a:endParaRPr lang="en-US" sz="1200" dirty="0">
+              <a:solidFill>
+                <a:srgbClr val="C00000"/>
+              </a:solidFill>
+              <a:effectLst>
+                <a:outerShdw blurRad="38100" dist="38100" dir="2700000" algn="tl">
+                  <a:srgbClr val="000000">
+                    <a:alpha val="43137"/>
+                  </a:srgbClr>
+                </a:outerShdw>
+              </a:effectLst>
+              <a:latin typeface="Times New Roman" panose="02020603050405020304" pitchFamily="18" charset="0"/>
+              <a:cs typeface="Times New Roman" panose="02020603050405020304" pitchFamily="18" charset="0"/>
+            </a:endParaRPr>
+          </a:p>
+        </p:txBody>
+      </p:sp>
     </p:spTree>
     <p:extLst>
       <p:ext uri="{BB962C8B-B14F-4D97-AF65-F5344CB8AC3E}">
@@ -19637,8 +20086,8 @@
         </p:nvSpPr>
         <p:spPr>
           <a:xfrm>
-            <a:off x="1059785" y="281175"/>
-            <a:ext cx="6719020" cy="610820"/>
+            <a:off x="1212488" y="268447"/>
+            <a:ext cx="6719020" cy="474202"/>
           </a:xfrm>
         </p:spPr>
         <p:txBody>
@@ -21119,8 +21568,8 @@
         </p:nvSpPr>
         <p:spPr>
           <a:xfrm>
-            <a:off x="1059785" y="281175"/>
-            <a:ext cx="6719020" cy="610820"/>
+            <a:off x="1212487" y="389373"/>
+            <a:ext cx="6719020" cy="371298"/>
           </a:xfrm>
         </p:spPr>
         <p:txBody>
@@ -21140,137 +21589,6 @@
               </a:rPr>
               <a:t>Our Application to Your Authority</a:t>
             </a:r>
-          </a:p>
-        </p:txBody>
-      </p:sp>
-      <p:sp>
-        <p:nvSpPr>
-          <p:cNvPr id="5" name="TextBox 4">
-            <a:extLst>
-              <a:ext uri="{FF2B5EF4-FFF2-40B4-BE49-F238E27FC236}">
-                <a16:creationId xmlns:a16="http://schemas.microsoft.com/office/drawing/2014/main" id="{3B3F653C-C9F2-4042-9DE2-C13F8AEF41C5}"/>
-              </a:ext>
-            </a:extLst>
-          </p:cNvPr>
-          <p:cNvSpPr txBox="1"/>
-          <p:nvPr/>
-        </p:nvSpPr>
-        <p:spPr>
-          <a:xfrm>
-            <a:off x="678022" y="1244660"/>
-            <a:ext cx="7787955" cy="1263166"/>
-          </a:xfrm>
-          <a:prstGeom prst="rect">
-            <a:avLst/>
-          </a:prstGeom>
-          <a:noFill/>
-        </p:spPr>
-        <p:txBody>
-          <a:bodyPr wrap="square">
-            <a:spAutoFit/>
-          </a:bodyPr>
-          <a:lstStyle/>
-          <a:p>
-            <a:pPr marL="342900" marR="0" lvl="0" indent="-342900" algn="just">
-              <a:lnSpc>
-                <a:spcPct val="107000"/>
-              </a:lnSpc>
-              <a:spcBef>
-                <a:spcPts val="0"/>
-              </a:spcBef>
-              <a:spcAft>
-                <a:spcPts val="0"/>
-              </a:spcAft>
-              <a:buFont typeface="+mj-lt"/>
-              <a:buAutoNum type="alphaLcParenR"/>
-            </a:pPr>
-            <a:r>
-              <a:rPr lang="en-US" sz="1800" dirty="0">
-                <a:effectLst/>
-                <a:latin typeface="Times New Roman" panose="02020603050405020304" pitchFamily="18" charset="0"/>
-                <a:ea typeface="Calibri" panose="020F0502020204030204" pitchFamily="34" charset="0"/>
-                <a:cs typeface="Times New Roman" panose="02020603050405020304" pitchFamily="18" charset="0"/>
-              </a:rPr>
-              <a:t>A general feasibility study for Training Need Assessment for Prisoners Project</a:t>
-            </a:r>
-            <a:endParaRPr lang="en-US" sz="1800" dirty="0">
-              <a:effectLst/>
-              <a:latin typeface="Calibri" panose="020F0502020204030204" pitchFamily="34" charset="0"/>
-              <a:ea typeface="Calibri" panose="020F0502020204030204" pitchFamily="34" charset="0"/>
-              <a:cs typeface="Times New Roman" panose="02020603050405020304" pitchFamily="18" charset="0"/>
-            </a:endParaRPr>
-          </a:p>
-          <a:p>
-            <a:pPr marL="342900" marR="0" lvl="0" indent="-342900" algn="just">
-              <a:lnSpc>
-                <a:spcPct val="107000"/>
-              </a:lnSpc>
-              <a:spcBef>
-                <a:spcPts val="0"/>
-              </a:spcBef>
-              <a:spcAft>
-                <a:spcPts val="0"/>
-              </a:spcAft>
-              <a:buFont typeface="+mj-lt"/>
-              <a:buAutoNum type="alphaLcParenR"/>
-            </a:pPr>
-            <a:r>
-              <a:rPr lang="en-US" sz="1800" dirty="0">
-                <a:effectLst/>
-                <a:latin typeface="Times New Roman" panose="02020603050405020304" pitchFamily="18" charset="0"/>
-                <a:ea typeface="Calibri" panose="020F0502020204030204" pitchFamily="34" charset="0"/>
-                <a:cs typeface="Times New Roman" panose="02020603050405020304" pitchFamily="18" charset="0"/>
-              </a:rPr>
-              <a:t>To conduct Basic Skilled Training for prisoners.</a:t>
-            </a:r>
-          </a:p>
-          <a:p>
-            <a:pPr marL="342900" marR="0" lvl="0" indent="-342900" algn="just">
-              <a:lnSpc>
-                <a:spcPct val="107000"/>
-              </a:lnSpc>
-              <a:spcBef>
-                <a:spcPts val="0"/>
-              </a:spcBef>
-              <a:spcAft>
-                <a:spcPts val="0"/>
-              </a:spcAft>
-              <a:buFont typeface="+mj-lt"/>
-              <a:buAutoNum type="alphaLcParenR"/>
-            </a:pPr>
-            <a:r>
-              <a:rPr lang="en-US" sz="1800" dirty="0">
-                <a:effectLst/>
-                <a:latin typeface="Times New Roman" panose="02020603050405020304" pitchFamily="18" charset="0"/>
-                <a:ea typeface="Calibri" panose="020F0502020204030204" pitchFamily="34" charset="0"/>
-                <a:cs typeface="Times New Roman" panose="02020603050405020304" pitchFamily="18" charset="0"/>
-              </a:rPr>
-              <a:t>Official cooperation and set up</a:t>
-            </a:r>
-          </a:p>
-          <a:p>
-            <a:pPr marL="342900" marR="0" lvl="0" indent="-342900" algn="just">
-              <a:lnSpc>
-                <a:spcPct val="107000"/>
-              </a:lnSpc>
-              <a:spcBef>
-                <a:spcPts val="0"/>
-              </a:spcBef>
-              <a:spcAft>
-                <a:spcPts val="800"/>
-              </a:spcAft>
-              <a:buFont typeface="+mj-lt"/>
-              <a:buAutoNum type="alphaLcParenR"/>
-            </a:pPr>
-            <a:r>
-              <a:rPr lang="en-US" sz="1800" dirty="0">
-                <a:effectLst/>
-                <a:latin typeface="Times New Roman" panose="02020603050405020304" pitchFamily="18" charset="0"/>
-                <a:ea typeface="Calibri" panose="020F0502020204030204" pitchFamily="34" charset="0"/>
-              </a:rPr>
-              <a:t>Awareness program for prisoners in different jails</a:t>
-            </a:r>
-            <a:endParaRPr lang="en-US" dirty="0"/>
           </a:p>
         </p:txBody>
       </p:sp>
@@ -21346,10 +21664,261 @@
           </a:prstGeom>
         </p:spPr>
       </p:pic>
+      <p:sp>
+        <p:nvSpPr>
+          <p:cNvPr id="10" name="Arrow: Pentagon 9">
+            <a:extLst>
+              <a:ext uri="{FF2B5EF4-FFF2-40B4-BE49-F238E27FC236}">
+                <a16:creationId xmlns:a16="http://schemas.microsoft.com/office/drawing/2014/main" id="{102AA1EF-038A-46FF-8379-96D530F29297}"/>
+              </a:ext>
+            </a:extLst>
+          </p:cNvPr>
+          <p:cNvSpPr/>
+          <p:nvPr/>
+        </p:nvSpPr>
+        <p:spPr>
+          <a:xfrm>
+            <a:off x="654415" y="1283873"/>
+            <a:ext cx="7936085" cy="371298"/>
+          </a:xfrm>
+          <a:prstGeom prst="homePlate">
+            <a:avLst/>
+          </a:prstGeom>
+          <a:ln>
+            <a:solidFill>
+              <a:schemeClr val="accent2">
+                <a:lumMod val="60000"/>
+                <a:lumOff val="40000"/>
+              </a:schemeClr>
+            </a:solidFill>
+          </a:ln>
+        </p:spPr>
+        <p:style>
+          <a:lnRef idx="2">
+            <a:schemeClr val="accent6"/>
+          </a:lnRef>
+          <a:fillRef idx="1">
+            <a:schemeClr val="lt1"/>
+          </a:fillRef>
+          <a:effectRef idx="0">
+            <a:schemeClr val="accent6"/>
+          </a:effectRef>
+          <a:fontRef idx="minor">
+            <a:schemeClr val="dk1"/>
+          </a:fontRef>
+        </p:style>
+        <p:txBody>
+          <a:bodyPr rtlCol="0" anchor="ctr"/>
+          <a:lstStyle/>
+          <a:p>
+            <a:pPr algn="ctr"/>
+            <a:r>
+              <a:rPr lang="en-US" dirty="0">
+                <a:effectLst>
+                  <a:outerShdw blurRad="38100" dist="38100" dir="2700000" algn="tl">
+                    <a:srgbClr val="000000">
+                      <a:alpha val="43137"/>
+                    </a:srgbClr>
+                  </a:outerShdw>
+                </a:effectLst>
+                <a:latin typeface="Times New Roman" panose="02020603050405020304" pitchFamily="18" charset="0"/>
+                <a:cs typeface="Times New Roman" panose="02020603050405020304" pitchFamily="18" charset="0"/>
+              </a:rPr>
+              <a:t>A general feasibility study for Training Need Assessment for Prisoners Project</a:t>
+            </a:r>
+          </a:p>
+        </p:txBody>
+      </p:sp>
+      <p:sp>
+        <p:nvSpPr>
+          <p:cNvPr id="12" name="Arrow: Pentagon 11">
+            <a:extLst>
+              <a:ext uri="{FF2B5EF4-FFF2-40B4-BE49-F238E27FC236}">
+                <a16:creationId xmlns:a16="http://schemas.microsoft.com/office/drawing/2014/main" id="{64BB070C-B05B-4E7C-B6E2-CDB37CD2CF0D}"/>
+              </a:ext>
+            </a:extLst>
+          </p:cNvPr>
+          <p:cNvSpPr/>
+          <p:nvPr/>
+        </p:nvSpPr>
+        <p:spPr>
+          <a:xfrm>
+            <a:off x="2205070" y="1916772"/>
+            <a:ext cx="4733855" cy="371298"/>
+          </a:xfrm>
+          <a:prstGeom prst="homePlate">
+            <a:avLst/>
+          </a:prstGeom>
+          <a:ln>
+            <a:solidFill>
+              <a:srgbClr val="92D050"/>
+            </a:solidFill>
+          </a:ln>
+        </p:spPr>
+        <p:style>
+          <a:lnRef idx="2">
+            <a:schemeClr val="accent6"/>
+          </a:lnRef>
+          <a:fillRef idx="1">
+            <a:schemeClr val="lt1"/>
+          </a:fillRef>
+          <a:effectRef idx="0">
+            <a:schemeClr val="accent6"/>
+          </a:effectRef>
+          <a:fontRef idx="minor">
+            <a:schemeClr val="dk1"/>
+          </a:fontRef>
+        </p:style>
+        <p:txBody>
+          <a:bodyPr rtlCol="0" anchor="ctr"/>
+          <a:lstStyle/>
+          <a:p>
+            <a:pPr algn="ctr"/>
+            <a:r>
+              <a:rPr lang="en-US" dirty="0">
+                <a:effectLst>
+                  <a:outerShdw blurRad="38100" dist="38100" dir="2700000" algn="tl">
+                    <a:srgbClr val="000000">
+                      <a:alpha val="43137"/>
+                    </a:srgbClr>
+                  </a:outerShdw>
+                </a:effectLst>
+                <a:latin typeface="Times New Roman" panose="02020603050405020304" pitchFamily="18" charset="0"/>
+                <a:cs typeface="Times New Roman" panose="02020603050405020304" pitchFamily="18" charset="0"/>
+              </a:rPr>
+              <a:t>To conduct Basic Skilled Training for prisoners</a:t>
+            </a:r>
+          </a:p>
+        </p:txBody>
+      </p:sp>
+      <p:sp>
+        <p:nvSpPr>
+          <p:cNvPr id="14" name="Arrow: Pentagon 13">
+            <a:extLst>
+              <a:ext uri="{FF2B5EF4-FFF2-40B4-BE49-F238E27FC236}">
+                <a16:creationId xmlns:a16="http://schemas.microsoft.com/office/drawing/2014/main" id="{9372EF17-C867-4576-8F7C-B2BFAA234E08}"/>
+              </a:ext>
+            </a:extLst>
+          </p:cNvPr>
+          <p:cNvSpPr/>
+          <p:nvPr/>
+        </p:nvSpPr>
+        <p:spPr>
+          <a:xfrm>
+            <a:off x="2854068" y="2552090"/>
+            <a:ext cx="3130454" cy="371298"/>
+          </a:xfrm>
+          <a:prstGeom prst="homePlate">
+            <a:avLst/>
+          </a:prstGeom>
+          <a:ln>
+            <a:solidFill>
+              <a:srgbClr val="990099"/>
+            </a:solidFill>
+          </a:ln>
+        </p:spPr>
+        <p:style>
+          <a:lnRef idx="2">
+            <a:schemeClr val="accent6"/>
+          </a:lnRef>
+          <a:fillRef idx="1">
+            <a:schemeClr val="lt1"/>
+          </a:fillRef>
+          <a:effectRef idx="0">
+            <a:schemeClr val="accent6"/>
+          </a:effectRef>
+          <a:fontRef idx="minor">
+            <a:schemeClr val="dk1"/>
+          </a:fontRef>
+        </p:style>
+        <p:txBody>
+          <a:bodyPr rtlCol="0" anchor="ctr"/>
+          <a:lstStyle/>
+          <a:p>
+            <a:pPr algn="ctr"/>
+            <a:r>
+              <a:rPr lang="en-US" dirty="0">
+                <a:effectLst>
+                  <a:outerShdw blurRad="38100" dist="38100" dir="2700000" algn="tl">
+                    <a:srgbClr val="000000">
+                      <a:alpha val="43137"/>
+                    </a:srgbClr>
+                  </a:outerShdw>
+                </a:effectLst>
+                <a:latin typeface="Times New Roman" panose="02020603050405020304" pitchFamily="18" charset="0"/>
+                <a:cs typeface="Times New Roman" panose="02020603050405020304" pitchFamily="18" charset="0"/>
+              </a:rPr>
+              <a:t>Official cooperation and set up</a:t>
+            </a:r>
+          </a:p>
+        </p:txBody>
+      </p:sp>
+      <p:sp>
+        <p:nvSpPr>
+          <p:cNvPr id="15" name="Arrow: Pentagon 14">
+            <a:extLst>
+              <a:ext uri="{FF2B5EF4-FFF2-40B4-BE49-F238E27FC236}">
+                <a16:creationId xmlns:a16="http://schemas.microsoft.com/office/drawing/2014/main" id="{237984E8-0982-4CD8-BB6D-A4EC14558607}"/>
+              </a:ext>
+            </a:extLst>
+          </p:cNvPr>
+          <p:cNvSpPr/>
+          <p:nvPr/>
+        </p:nvSpPr>
+        <p:spPr>
+          <a:xfrm>
+            <a:off x="2090542" y="3182570"/>
+            <a:ext cx="4962913" cy="371298"/>
+          </a:xfrm>
+          <a:prstGeom prst="homePlate">
+            <a:avLst/>
+          </a:prstGeom>
+          <a:ln>
+            <a:solidFill>
+              <a:schemeClr val="accent5"/>
+            </a:solidFill>
+          </a:ln>
+        </p:spPr>
+        <p:style>
+          <a:lnRef idx="2">
+            <a:schemeClr val="accent6"/>
+          </a:lnRef>
+          <a:fillRef idx="1">
+            <a:schemeClr val="lt1"/>
+          </a:fillRef>
+          <a:effectRef idx="0">
+            <a:schemeClr val="accent6"/>
+          </a:effectRef>
+          <a:fontRef idx="minor">
+            <a:schemeClr val="dk1"/>
+          </a:fontRef>
+        </p:style>
+        <p:txBody>
+          <a:bodyPr rtlCol="0" anchor="ctr"/>
+          <a:lstStyle/>
+          <a:p>
+            <a:pPr algn="ctr"/>
+            <a:r>
+              <a:rPr lang="en-US" dirty="0">
+                <a:effectLst>
+                  <a:outerShdw blurRad="38100" dist="38100" dir="2700000" algn="tl">
+                    <a:srgbClr val="000000">
+                      <a:alpha val="43137"/>
+                    </a:srgbClr>
+                  </a:outerShdw>
+                </a:effectLst>
+                <a:latin typeface="Times New Roman" panose="02020603050405020304" pitchFamily="18" charset="0"/>
+                <a:cs typeface="Times New Roman" panose="02020603050405020304" pitchFamily="18" charset="0"/>
+              </a:rPr>
+              <a:t>Awareness program for prisoners in different jails</a:t>
+            </a:r>
+          </a:p>
+        </p:txBody>
+      </p:sp>
     </p:spTree>
     <p:extLst>
       <p:ext uri="{BB962C8B-B14F-4D97-AF65-F5344CB8AC3E}">
-        <p14:creationId xmlns:p14="http://schemas.microsoft.com/office/powerpoint/2010/main" val="702158692"/>
+        <p14:creationId xmlns:p14="http://schemas.microsoft.com/office/powerpoint/2010/main" val="2200652550"/>
       </p:ext>
     </p:extLst>
   </p:cSld>
@@ -21442,6 +22011,8 @@
               <a:spcBef>
                 <a:spcPts val="0"/>
               </a:spcBef>
+              <a:buFont typeface="Wingdings" panose="05000000000000000000" pitchFamily="2" charset="2"/>
+              <a:buChar char="ü"/>
             </a:pPr>
             <a:r>
               <a:rPr lang="en-US" sz="1800" dirty="0">
@@ -21459,6 +22030,8 @@
               <a:spcBef>
                 <a:spcPts val="0"/>
               </a:spcBef>
+              <a:buFont typeface="Wingdings" panose="05000000000000000000" pitchFamily="2" charset="2"/>
+              <a:buChar char="ü"/>
             </a:pPr>
             <a:r>
               <a:rPr lang="en-US" sz="1800" dirty="0">
@@ -21476,6 +22049,8 @@
               <a:spcBef>
                 <a:spcPts val="0"/>
               </a:spcBef>
+              <a:buFont typeface="Wingdings" panose="05000000000000000000" pitchFamily="2" charset="2"/>
+              <a:buChar char="ü"/>
             </a:pPr>
             <a:r>
               <a:rPr lang="en-US" sz="1800" dirty="0">
@@ -21714,6 +22289,11 @@
             <a:off x="906462" y="738981"/>
             <a:ext cx="7331076" cy="3665538"/>
           </a:xfrm>
+          <a:ln>
+            <a:solidFill>
+              <a:schemeClr val="tx1"/>
+            </a:solidFill>
+          </a:ln>
         </p:spPr>
       </p:pic>
     </p:spTree>
@@ -21961,7 +22541,7 @@
                 <a:ea typeface="Calibri" panose="020F0502020204030204" pitchFamily="34" charset="0"/>
                 <a:cs typeface="Times New Roman" panose="02020603050405020304" pitchFamily="18" charset="0"/>
               </a:rPr>
-              <a:t>One stop solution for Job Placement after in-prison training for different shops, Commercial Edifices and Corporate Premises</a:t>
+              <a:t>One stop solution for Job Placement after in-prison training for different Shops, Commercial Edifices and Corporate Premises</a:t>
             </a:r>
           </a:p>
         </p:txBody>
@@ -21980,7 +22560,7 @@
         </p:nvSpPr>
         <p:spPr>
           <a:xfrm>
-            <a:off x="2281425" y="1846102"/>
+            <a:off x="2281425" y="1655520"/>
             <a:ext cx="6561740" cy="1754326"/>
           </a:xfrm>
           <a:prstGeom prst="rect">
@@ -22003,21 +22583,21 @@
                 <a:latin typeface="Times New Roman" panose="02020603050405020304" pitchFamily="18" charset="0"/>
                 <a:cs typeface="Times New Roman" panose="02020603050405020304" pitchFamily="18" charset="0"/>
               </a:rPr>
-              <a:t>Training for general prisoners in ICT, hardware and software, refrigeration, electronics, general mechanics (motorcycle, vehicles etc.), wielding, </a:t>
+              <a:t>Training for general prisoners in ICT, Hardware &amp; Software, Refrigeration, Electronics, General Mechanics (Motorcycle, Vehicles etc.), Wielding, </a:t>
             </a:r>
             <a:r>
               <a:rPr lang="en-US" sz="1200" dirty="0" err="1">
                 <a:latin typeface="Times New Roman" panose="02020603050405020304" pitchFamily="18" charset="0"/>
                 <a:cs typeface="Times New Roman" panose="02020603050405020304" pitchFamily="18" charset="0"/>
               </a:rPr>
-              <a:t>agro</a:t>
+              <a:t>Agro</a:t>
             </a:r>
             <a:r>
               <a:rPr lang="en-US" sz="1200" dirty="0">
                 <a:latin typeface="Times New Roman" panose="02020603050405020304" pitchFamily="18" charset="0"/>
                 <a:cs typeface="Times New Roman" panose="02020603050405020304" pitchFamily="18" charset="0"/>
               </a:rPr>
-              <a:t>-farming, agri-food processing, cattle rearing (cow, goat, duck etc.)</a:t>
+              <a:t>-Farming, Agri-Food Processing, Cattle Rearing (Cow, Goat, Duck etc.)</a:t>
             </a:r>
           </a:p>
           <a:p>
@@ -22114,8 +22694,8 @@
         </p:nvSpPr>
         <p:spPr>
           <a:xfrm>
-            <a:off x="2281425" y="3811074"/>
-            <a:ext cx="5030115" cy="769441"/>
+            <a:off x="2258941" y="3645424"/>
+            <a:ext cx="5030115" cy="830997"/>
           </a:xfrm>
           <a:prstGeom prst="rect">
             <a:avLst/>
@@ -22133,7 +22713,7 @@
               <a:buChar char="ü"/>
             </a:pPr>
             <a:r>
-              <a:rPr lang="en-US" sz="1100" dirty="0">
+              <a:rPr lang="en-US" sz="1200" dirty="0">
                 <a:latin typeface="Times New Roman" panose="02020603050405020304" pitchFamily="18" charset="0"/>
                 <a:cs typeface="Times New Roman" panose="02020603050405020304" pitchFamily="18" charset="0"/>
               </a:rPr>
@@ -22146,7 +22726,7 @@
               <a:buChar char="ü"/>
             </a:pPr>
             <a:r>
-              <a:rPr lang="en-US" sz="1100" dirty="0">
+              <a:rPr lang="en-US" sz="1200" dirty="0">
                 <a:latin typeface="Times New Roman" panose="02020603050405020304" pitchFamily="18" charset="0"/>
                 <a:cs typeface="Times New Roman" panose="02020603050405020304" pitchFamily="18" charset="0"/>
               </a:rPr>
@@ -22159,7 +22739,7 @@
               <a:buChar char="ü"/>
             </a:pPr>
             <a:r>
-              <a:rPr lang="en-US" sz="1100" dirty="0">
+              <a:rPr lang="en-US" sz="1200" dirty="0">
                 <a:latin typeface="Times New Roman" panose="02020603050405020304" pitchFamily="18" charset="0"/>
                 <a:cs typeface="Times New Roman" panose="02020603050405020304" pitchFamily="18" charset="0"/>
               </a:rPr>
@@ -22172,7 +22752,7 @@
               <a:buChar char="ü"/>
             </a:pPr>
             <a:r>
-              <a:rPr lang="en-US" sz="1100" dirty="0">
+              <a:rPr lang="en-US" sz="1200" dirty="0">
                 <a:latin typeface="Times New Roman" panose="02020603050405020304" pitchFamily="18" charset="0"/>
                 <a:cs typeface="Times New Roman" panose="02020603050405020304" pitchFamily="18" charset="0"/>
               </a:rPr>
@@ -22195,8 +22775,8 @@
         </p:nvSpPr>
         <p:spPr>
           <a:xfrm>
-            <a:off x="209662" y="964166"/>
-            <a:ext cx="1766354" cy="501987"/>
+            <a:off x="209660" y="964166"/>
+            <a:ext cx="1829621" cy="501987"/>
           </a:xfrm>
           <a:prstGeom prst="homePlate">
             <a:avLst/>
@@ -22228,6 +22808,13 @@
             <a:pPr algn="ctr"/>
             <a:r>
               <a:rPr lang="en-US" dirty="0">
+                <a:effectLst>
+                  <a:outerShdw blurRad="38100" dist="38100" dir="2700000" algn="tl">
+                    <a:srgbClr val="000000">
+                      <a:alpha val="43137"/>
+                    </a:srgbClr>
+                  </a:outerShdw>
+                </a:effectLst>
                 <a:latin typeface="Times New Roman" panose="02020603050405020304" pitchFamily="18" charset="0"/>
                 <a:cs typeface="Times New Roman" panose="02020603050405020304" pitchFamily="18" charset="0"/>
               </a:rPr>
@@ -22250,7 +22837,7 @@
         </p:nvSpPr>
         <p:spPr>
           <a:xfrm>
-            <a:off x="209661" y="2431499"/>
+            <a:off x="209660" y="2281689"/>
             <a:ext cx="1829621" cy="501987"/>
           </a:xfrm>
           <a:prstGeom prst="homePlate">
@@ -22283,6 +22870,13 @@
             <a:pPr algn="ctr"/>
             <a:r>
               <a:rPr lang="en-US" dirty="0">
+                <a:effectLst>
+                  <a:outerShdw blurRad="38100" dist="38100" dir="2700000" algn="tl">
+                    <a:srgbClr val="000000">
+                      <a:alpha val="43137"/>
+                    </a:srgbClr>
+                  </a:outerShdw>
+                </a:effectLst>
                 <a:latin typeface="Times New Roman" panose="02020603050405020304" pitchFamily="18" charset="0"/>
                 <a:cs typeface="Times New Roman" panose="02020603050405020304" pitchFamily="18" charset="0"/>
               </a:rPr>
@@ -22305,8 +22899,8 @@
         </p:nvSpPr>
         <p:spPr>
           <a:xfrm>
-            <a:off x="209661" y="3944800"/>
-            <a:ext cx="1768275" cy="501987"/>
+            <a:off x="209660" y="3809928"/>
+            <a:ext cx="1829621" cy="501987"/>
           </a:xfrm>
           <a:prstGeom prst="homePlate">
             <a:avLst/>
@@ -22338,6 +22932,13 @@
             <a:pPr algn="ctr"/>
             <a:r>
               <a:rPr lang="en-US" dirty="0">
+                <a:effectLst>
+                  <a:outerShdw blurRad="38100" dist="38100" dir="2700000" algn="tl">
+                    <a:srgbClr val="000000">
+                      <a:alpha val="43137"/>
+                    </a:srgbClr>
+                  </a:outerShdw>
+                </a:effectLst>
                 <a:latin typeface="Times New Roman" panose="02020603050405020304" pitchFamily="18" charset="0"/>
                 <a:cs typeface="Times New Roman" panose="02020603050405020304" pitchFamily="18" charset="0"/>
               </a:rPr>
@@ -22504,14 +23105,14 @@
           <p:nvPr>
             <p:extLst>
               <p:ext uri="{D42A27DB-BD31-4B8C-83A1-F6EECF244321}">
-                <p14:modId xmlns:p14="http://schemas.microsoft.com/office/powerpoint/2010/main" val="2388732542"/>
+                <p14:modId xmlns:p14="http://schemas.microsoft.com/office/powerpoint/2010/main" val="1237480613"/>
               </p:ext>
             </p:extLst>
           </p:nvPr>
         </p:nvGraphicFramePr>
         <p:xfrm>
           <a:off x="296260" y="1304557"/>
-          <a:ext cx="5419787" cy="1221639"/>
+          <a:ext cx="5344675" cy="1221639"/>
         </p:xfrm>
         <a:graphic>
           <a:graphicData uri="http://schemas.openxmlformats.org/drawingml/2006/table">
@@ -22520,14 +23121,14 @@
                 <a:tableStyleId>{F5AB1C69-6EDB-4FF4-983F-18BD219EF322}</a:tableStyleId>
               </a:tblPr>
               <a:tblGrid>
-                <a:gridCol w="2309301">
+                <a:gridCol w="2277297">
                   <a:extLst>
                     <a:ext uri="{9D8B030D-6E8A-4147-A177-3AD203B41FA5}">
                       <a16:colId xmlns:a16="http://schemas.microsoft.com/office/drawing/2014/main" val="997834168"/>
                     </a:ext>
                   </a:extLst>
                 </a:gridCol>
-                <a:gridCol w="3110486">
+                <a:gridCol w="3067378">
                   <a:extLst>
                     <a:ext uri="{9D8B030D-6E8A-4147-A177-3AD203B41FA5}">
                       <a16:colId xmlns:a16="http://schemas.microsoft.com/office/drawing/2014/main" val="729624163"/>
@@ -23014,12 +23615,17 @@
         </p:blipFill>
         <p:spPr>
           <a:xfrm>
-            <a:off x="5716047" y="2786053"/>
-            <a:ext cx="2826283" cy="1476103"/>
+            <a:off x="5793640" y="1960931"/>
+            <a:ext cx="2748690" cy="1679754"/>
           </a:xfrm>
           <a:prstGeom prst="rect">
             <a:avLst/>
           </a:prstGeom>
+          <a:ln>
+            <a:solidFill>
+              <a:schemeClr val="tx1"/>
+            </a:solidFill>
+          </a:ln>
         </p:spPr>
       </p:pic>
     </p:spTree>
@@ -23129,8 +23735,8 @@
         </p:nvSpPr>
         <p:spPr>
           <a:xfrm>
-            <a:off x="108472" y="682468"/>
-            <a:ext cx="5379758" cy="369332"/>
+            <a:off x="601669" y="834113"/>
+            <a:ext cx="5344676" cy="369332"/>
           </a:xfrm>
           <a:prstGeom prst="rect">
             <a:avLst/>
@@ -24499,7 +25105,13 @@
             </a:pPr>
             <a:r>
               <a:rPr lang="en-US" sz="1600" b="1" dirty="0">
-                <a:effectLst/>
+                <a:effectLst>
+                  <a:outerShdw blurRad="38100" dist="38100" dir="2700000" algn="tl">
+                    <a:srgbClr val="000000">
+                      <a:alpha val="43137"/>
+                    </a:srgbClr>
+                  </a:outerShdw>
+                </a:effectLst>
                 <a:latin typeface="Times New Roman" panose="02020603050405020304" pitchFamily="18" charset="0"/>
                 <a:ea typeface="Calibri" panose="020F0502020204030204" pitchFamily="34" charset="0"/>
                 <a:cs typeface="Times New Roman" panose="02020603050405020304" pitchFamily="18" charset="0"/>
@@ -24507,7 +25119,13 @@
               <a:t>10 Central Jails:</a:t>
             </a:r>
             <a:endParaRPr lang="en-US" sz="1600" dirty="0">
-              <a:effectLst/>
+              <a:effectLst>
+                <a:outerShdw blurRad="38100" dist="38100" dir="2700000" algn="tl">
+                  <a:srgbClr val="000000">
+                    <a:alpha val="43137"/>
+                  </a:srgbClr>
+                </a:outerShdw>
+              </a:effectLst>
               <a:latin typeface="Calibri" panose="020F0502020204030204" pitchFamily="34" charset="0"/>
               <a:ea typeface="Calibri" panose="020F0502020204030204" pitchFamily="34" charset="0"/>
               <a:cs typeface="Times New Roman" panose="02020603050405020304" pitchFamily="18" charset="0"/>
@@ -24826,7 +25444,13 @@
             </a:pPr>
             <a:r>
               <a:rPr lang="en-US" sz="1800" b="1" dirty="0">
-                <a:effectLst/>
+                <a:effectLst>
+                  <a:outerShdw blurRad="38100" dist="38100" dir="2700000" algn="tl">
+                    <a:srgbClr val="000000">
+                      <a:alpha val="43137"/>
+                    </a:srgbClr>
+                  </a:outerShdw>
+                </a:effectLst>
                 <a:latin typeface="Times New Roman" panose="02020603050405020304" pitchFamily="18" charset="0"/>
                 <a:ea typeface="Calibri" panose="020F0502020204030204" pitchFamily="34" charset="0"/>
                 <a:cs typeface="Times New Roman" panose="02020603050405020304" pitchFamily="18" charset="0"/>
@@ -24834,7 +25458,13 @@
               <a:t>20 District Jails: Discussion Based</a:t>
             </a:r>
             <a:endParaRPr lang="en-US" sz="1800" dirty="0">
-              <a:effectLst/>
+              <a:effectLst>
+                <a:outerShdw blurRad="38100" dist="38100" dir="2700000" algn="tl">
+                  <a:srgbClr val="000000">
+                    <a:alpha val="43137"/>
+                  </a:srgbClr>
+                </a:outerShdw>
+              </a:effectLst>
               <a:latin typeface="Calibri" panose="020F0502020204030204" pitchFamily="34" charset="0"/>
               <a:ea typeface="Calibri" panose="020F0502020204030204" pitchFamily="34" charset="0"/>
               <a:cs typeface="Times New Roman" panose="02020603050405020304" pitchFamily="18" charset="0"/>
@@ -24948,6 +25578,11 @@
           <a:prstGeom prst="rect">
             <a:avLst/>
           </a:prstGeom>
+          <a:ln>
+            <a:solidFill>
+              <a:schemeClr val="tx1"/>
+            </a:solidFill>
+          </a:ln>
         </p:spPr>
       </p:pic>
     </p:spTree>
@@ -25058,7 +25693,7 @@
           <p:nvPr>
             <p:extLst>
               <p:ext uri="{D42A27DB-BD31-4B8C-83A1-F6EECF244321}">
-                <p14:modId xmlns:p14="http://schemas.microsoft.com/office/powerpoint/2010/main" val="2169435857"/>
+                <p14:modId xmlns:p14="http://schemas.microsoft.com/office/powerpoint/2010/main" val="473991584"/>
               </p:ext>
             </p:extLst>
           </p:nvPr>
@@ -25368,7 +26003,7 @@
                           <a:latin typeface="Times New Roman" panose="02020603050405020304" pitchFamily="18" charset="0"/>
                           <a:cs typeface="Times New Roman" panose="02020603050405020304" pitchFamily="18" charset="0"/>
                         </a:rPr>
-                        <a:t>On-spot survey</a:t>
+                        <a:t>On-Spot Survey</a:t>
                       </a:r>
                       <a:endParaRPr lang="en-US" sz="1400" dirty="0">
                         <a:solidFill>
@@ -25445,7 +26080,7 @@
                           <a:latin typeface="Times New Roman" panose="02020603050405020304" pitchFamily="18" charset="0"/>
                           <a:cs typeface="Times New Roman" panose="02020603050405020304" pitchFamily="18" charset="0"/>
                         </a:rPr>
-                        <a:t>Online based survey</a:t>
+                        <a:t>Online Based Survey</a:t>
                       </a:r>
                       <a:endParaRPr lang="en-US" sz="1400" dirty="0">
                         <a:solidFill>
@@ -25522,7 +26157,7 @@
                           <a:latin typeface="Times New Roman" panose="02020603050405020304" pitchFamily="18" charset="0"/>
                           <a:cs typeface="Times New Roman" panose="02020603050405020304" pitchFamily="18" charset="0"/>
                         </a:rPr>
-                        <a:t>KII and reporting method</a:t>
+                        <a:t>KII and Reporting Method</a:t>
                       </a:r>
                       <a:endParaRPr lang="en-US" sz="1400" dirty="0">
                         <a:solidFill>
@@ -25748,7 +26383,7 @@
                           <a:latin typeface="Times New Roman" panose="02020603050405020304" pitchFamily="18" charset="0"/>
                           <a:cs typeface="Times New Roman" panose="02020603050405020304" pitchFamily="18" charset="0"/>
                         </a:rPr>
-                        <a:t>Hardware lab Development</a:t>
+                        <a:t>Hardware Lab Development</a:t>
                       </a:r>
                       <a:endParaRPr lang="en-US" sz="1400" dirty="0">
                         <a:solidFill>
@@ -25825,7 +26460,7 @@
                           <a:latin typeface="Times New Roman" panose="02020603050405020304" pitchFamily="18" charset="0"/>
                           <a:cs typeface="Times New Roman" panose="02020603050405020304" pitchFamily="18" charset="0"/>
                         </a:rPr>
-                        <a:t>Workshop development (electrical, mechanical, house wearing, motor vehicles, wielding and others)</a:t>
+                        <a:t>Workshop Development (Electrical, Mechanical, House Wearing, Motor Vehicles, Wielding and others)</a:t>
                       </a:r>
                       <a:endParaRPr lang="en-US" sz="1400" dirty="0">
                         <a:solidFill>
@@ -25902,7 +26537,7 @@
                           <a:latin typeface="Times New Roman" panose="02020603050405020304" pitchFamily="18" charset="0"/>
                           <a:cs typeface="Times New Roman" panose="02020603050405020304" pitchFamily="18" charset="0"/>
                         </a:rPr>
-                        <a:t>Online Training program for hosing Societies</a:t>
+                        <a:t>Online Training Program for Hosing Societies</a:t>
                       </a:r>
                       <a:endParaRPr lang="en-US" sz="1400" dirty="0">
                         <a:solidFill>
@@ -25979,7 +26614,7 @@
                           <a:latin typeface="Times New Roman" panose="02020603050405020304" pitchFamily="18" charset="0"/>
                           <a:cs typeface="Times New Roman" panose="02020603050405020304" pitchFamily="18" charset="0"/>
                         </a:rPr>
-                        <a:t>Offline Training program</a:t>
+                        <a:t>Offline Training Program</a:t>
                       </a:r>
                       <a:endParaRPr lang="en-US" sz="1400" dirty="0">
                         <a:solidFill>
@@ -26056,7 +26691,7 @@
                           <a:latin typeface="Times New Roman" panose="02020603050405020304" pitchFamily="18" charset="0"/>
                           <a:cs typeface="Times New Roman" panose="02020603050405020304" pitchFamily="18" charset="0"/>
                         </a:rPr>
-                        <a:t>Course materials development (E-Learning)</a:t>
+                        <a:t>Course Materials Development (E-Learning)</a:t>
                       </a:r>
                       <a:endParaRPr lang="en-US" sz="1400" dirty="0">
                         <a:solidFill>
@@ -26133,7 +26768,7 @@
                           <a:latin typeface="Times New Roman" panose="02020603050405020304" pitchFamily="18" charset="0"/>
                           <a:cs typeface="Times New Roman" panose="02020603050405020304" pitchFamily="18" charset="0"/>
                         </a:rPr>
-                        <a:t>On ground practical training with materials</a:t>
+                        <a:t>On-Ground Practical Training with Materials</a:t>
                       </a:r>
                       <a:endParaRPr lang="en-US" sz="1400" dirty="0">
                         <a:solidFill>
@@ -26282,7 +26917,7 @@
                           <a:latin typeface="Times New Roman" panose="02020603050405020304" pitchFamily="18" charset="0"/>
                           <a:cs typeface="Times New Roman" panose="02020603050405020304" pitchFamily="18" charset="0"/>
                         </a:rPr>
-                        <a:t>Practical training</a:t>
+                        <a:t>Practical Training</a:t>
                       </a:r>
                       <a:endParaRPr lang="en-US" sz="1400" dirty="0">
                         <a:solidFill>
@@ -26359,7 +26994,7 @@
                           <a:latin typeface="Times New Roman" panose="02020603050405020304" pitchFamily="18" charset="0"/>
                           <a:cs typeface="Times New Roman" panose="02020603050405020304" pitchFamily="18" charset="0"/>
                         </a:rPr>
-                        <a:t>Online training</a:t>
+                        <a:t>Online Training</a:t>
                       </a:r>
                       <a:endParaRPr lang="en-US" sz="1400" dirty="0">
                         <a:solidFill>
@@ -26436,7 +27071,7 @@
                           <a:latin typeface="Times New Roman" panose="02020603050405020304" pitchFamily="18" charset="0"/>
                           <a:cs typeface="Times New Roman" panose="02020603050405020304" pitchFamily="18" charset="0"/>
                         </a:rPr>
-                        <a:t>Direct job-oriented training</a:t>
+                        <a:t>Direct Job-Oriented Training</a:t>
                       </a:r>
                       <a:endParaRPr lang="en-US" sz="1400" dirty="0">
                         <a:solidFill>
@@ -26604,7 +27239,7 @@
                           <a:latin typeface="Times New Roman" panose="02020603050405020304" pitchFamily="18" charset="0"/>
                           <a:cs typeface="Times New Roman" panose="02020603050405020304" pitchFamily="18" charset="0"/>
                         </a:rPr>
-                        <a:t>Central jail and district jail wise awareness program</a:t>
+                        <a:t>Central Jail and District Jail wise Awareness Program</a:t>
                       </a:r>
                       <a:endParaRPr lang="en-US" sz="1400" dirty="0">
                         <a:solidFill>
@@ -26681,7 +27316,7 @@
                           <a:latin typeface="Times New Roman" panose="02020603050405020304" pitchFamily="18" charset="0"/>
                           <a:cs typeface="Times New Roman" panose="02020603050405020304" pitchFamily="18" charset="0"/>
                         </a:rPr>
-                        <a:t>Non-formal education for job awareness</a:t>
+                        <a:t>Non-Formal Education for Job Awareness</a:t>
                       </a:r>
                       <a:endParaRPr lang="en-US" sz="1400" dirty="0">
                         <a:solidFill>
@@ -26758,7 +27393,7 @@
                           <a:latin typeface="Times New Roman" panose="02020603050405020304" pitchFamily="18" charset="0"/>
                           <a:cs typeface="Times New Roman" panose="02020603050405020304" pitchFamily="18" charset="0"/>
                         </a:rPr>
-                        <a:t>Special day wise awareness program</a:t>
+                        <a:t>Special Day wise Awareness Program</a:t>
                       </a:r>
                       <a:endParaRPr lang="en-US" sz="1400" dirty="0">
                         <a:solidFill>
@@ -26979,7 +27614,7 @@
           <p:nvPr>
             <p:extLst>
               <p:ext uri="{D42A27DB-BD31-4B8C-83A1-F6EECF244321}">
-                <p14:modId xmlns:p14="http://schemas.microsoft.com/office/powerpoint/2010/main" val="376691753"/>
+                <p14:modId xmlns:p14="http://schemas.microsoft.com/office/powerpoint/2010/main" val="1461977928"/>
               </p:ext>
             </p:extLst>
           </p:nvPr>
@@ -27273,7 +27908,7 @@
                           <a:latin typeface="Times New Roman" panose="02020603050405020304" pitchFamily="18" charset="0"/>
                           <a:cs typeface="Times New Roman" panose="02020603050405020304" pitchFamily="18" charset="0"/>
                         </a:rPr>
-                        <a:t>Desired number of Participants</a:t>
+                        <a:t>Desired Number of Participants</a:t>
                       </a:r>
                       <a:endParaRPr lang="en-US" sz="1200" dirty="0">
                         <a:solidFill>
@@ -27315,17 +27950,17 @@
                         </a:spcAft>
                       </a:pPr>
                       <a:r>
-                        <a:rPr lang="en-US" sz="1200">
-                          <a:solidFill>
-                            <a:schemeClr val="tx1"/>
-                          </a:solidFill>
-                          <a:effectLst/>
-                          <a:latin typeface="Times New Roman" panose="02020603050405020304" pitchFamily="18" charset="0"/>
-                          <a:cs typeface="Times New Roman" panose="02020603050405020304" pitchFamily="18" charset="0"/>
-                        </a:rPr>
-                        <a:t>Total number of desired Participants</a:t>
-                      </a:r>
-                      <a:endParaRPr lang="en-US" sz="1200">
+                        <a:rPr lang="en-US" sz="1200" dirty="0">
+                          <a:solidFill>
+                            <a:schemeClr val="tx1"/>
+                          </a:solidFill>
+                          <a:effectLst/>
+                          <a:latin typeface="Times New Roman" panose="02020603050405020304" pitchFamily="18" charset="0"/>
+                          <a:cs typeface="Times New Roman" panose="02020603050405020304" pitchFamily="18" charset="0"/>
+                        </a:rPr>
+                        <a:t>Total Number of Desired Participants</a:t>
+                      </a:r>
+                      <a:endParaRPr lang="en-US" sz="1200" dirty="0">
                         <a:solidFill>
                           <a:schemeClr val="tx1"/>
                         </a:solidFill>
@@ -30125,7 +30760,7 @@
                         </a:spcAft>
                       </a:pPr>
                       <a:r>
-                        <a:rPr lang="en-US" sz="1200">
+                        <a:rPr lang="en-US" sz="1200" dirty="0">
                           <a:solidFill>
                             <a:schemeClr val="tx1"/>
                           </a:solidFill>
@@ -30135,7 +30770,7 @@
                         </a:rPr>
                         <a:t>Front Desk Executive</a:t>
                       </a:r>
-                      <a:endParaRPr lang="en-US" sz="1200">
+                      <a:endParaRPr lang="en-US" sz="1200" dirty="0">
                         <a:solidFill>
                           <a:schemeClr val="tx1"/>
                         </a:solidFill>
@@ -30401,17 +31036,17 @@
                         </a:spcAft>
                       </a:pPr>
                       <a:r>
-                        <a:rPr lang="en-US" sz="1200">
-                          <a:solidFill>
-                            <a:schemeClr val="tx1"/>
-                          </a:solidFill>
-                          <a:effectLst/>
-                          <a:latin typeface="Times New Roman" panose="02020603050405020304" pitchFamily="18" charset="0"/>
-                          <a:cs typeface="Times New Roman" panose="02020603050405020304" pitchFamily="18" charset="0"/>
-                        </a:rPr>
-                        <a:t>Auto mechanics</a:t>
-                      </a:r>
-                      <a:endParaRPr lang="en-US" sz="1200">
+                        <a:rPr lang="en-US" sz="1200" dirty="0">
+                          <a:solidFill>
+                            <a:schemeClr val="tx1"/>
+                          </a:solidFill>
+                          <a:effectLst/>
+                          <a:latin typeface="Times New Roman" panose="02020603050405020304" pitchFamily="18" charset="0"/>
+                          <a:cs typeface="Times New Roman" panose="02020603050405020304" pitchFamily="18" charset="0"/>
+                        </a:rPr>
+                        <a:t>Auto Mechanics</a:t>
+                      </a:r>
+                      <a:endParaRPr lang="en-US" sz="1200" dirty="0">
                         <a:solidFill>
                           <a:schemeClr val="tx1"/>
                         </a:solidFill>
@@ -30551,7 +31186,7 @@
                         </a:spcAft>
                       </a:pPr>
                       <a:r>
-                        <a:rPr lang="en-US" sz="1200">
+                        <a:rPr lang="en-US" sz="1200" dirty="0">
                           <a:solidFill>
                             <a:schemeClr val="tx1"/>
                           </a:solidFill>
@@ -30561,7 +31196,7 @@
                         </a:rPr>
                         <a:t>40</a:t>
                       </a:r>
-                      <a:endParaRPr lang="en-US" sz="1200">
+                      <a:endParaRPr lang="en-US" sz="1200" dirty="0">
                         <a:solidFill>
                           <a:schemeClr val="tx1"/>
                         </a:solidFill>
@@ -30903,10 +31538,10 @@
       </p:sp>
       <p:graphicFrame>
         <p:nvGraphicFramePr>
-          <p:cNvPr id="5" name="Table 4">
+          <p:cNvPr id="3" name="Table 2">
             <a:extLst>
               <a:ext uri="{FF2B5EF4-FFF2-40B4-BE49-F238E27FC236}">
-                <a16:creationId xmlns:a16="http://schemas.microsoft.com/office/drawing/2014/main" id="{77957F1C-410C-4579-A7D1-2AB44770D194}"/>
+                <a16:creationId xmlns:a16="http://schemas.microsoft.com/office/drawing/2014/main" id="{E9F823EA-04B9-450C-927C-C8213DA94BE7}"/>
               </a:ext>
             </a:extLst>
           </p:cNvPr>
@@ -30916,14 +31551,14 @@
           <p:nvPr>
             <p:extLst>
               <p:ext uri="{D42A27DB-BD31-4B8C-83A1-F6EECF244321}">
-                <p14:modId xmlns:p14="http://schemas.microsoft.com/office/powerpoint/2010/main" val="3290334491"/>
+                <p14:modId xmlns:p14="http://schemas.microsoft.com/office/powerpoint/2010/main" val="3605513767"/>
               </p:ext>
             </p:extLst>
           </p:nvPr>
         </p:nvGraphicFramePr>
         <p:xfrm>
-          <a:off x="296260" y="629151"/>
-          <a:ext cx="8551480" cy="3885198"/>
+          <a:off x="219907" y="586585"/>
+          <a:ext cx="8704184" cy="3970330"/>
         </p:xfrm>
         <a:graphic>
           <a:graphicData uri="http://schemas.openxmlformats.org/drawingml/2006/table">
@@ -30932,14 +31567,14 @@
                 <a:tableStyleId>{F5AB1C69-6EDB-4FF4-983F-18BD219EF322}</a:tableStyleId>
               </a:tblPr>
               <a:tblGrid>
-                <a:gridCol w="458115">
+                <a:gridCol w="621729">
                   <a:extLst>
                     <a:ext uri="{9D8B030D-6E8A-4147-A177-3AD203B41FA5}">
                       <a16:colId xmlns:a16="http://schemas.microsoft.com/office/drawing/2014/main" val="996137088"/>
                     </a:ext>
                   </a:extLst>
                 </a:gridCol>
-                <a:gridCol w="2443279">
+                <a:gridCol w="2508724">
                   <a:extLst>
                     <a:ext uri="{9D8B030D-6E8A-4147-A177-3AD203B41FA5}">
                       <a16:colId xmlns:a16="http://schemas.microsoft.com/office/drawing/2014/main" val="1021040478"/>
@@ -30960,14 +31595,14 @@
                     </a:ext>
                   </a:extLst>
                 </a:gridCol>
-                <a:gridCol w="1679755">
+                <a:gridCol w="1723876">
                   <a:extLst>
                     <a:ext uri="{9D8B030D-6E8A-4147-A177-3AD203B41FA5}">
                       <a16:colId xmlns:a16="http://schemas.microsoft.com/office/drawing/2014/main" val="2004141260"/>
                     </a:ext>
                   </a:extLst>
                 </a:gridCol>
-                <a:gridCol w="1527051">
+                <a:gridCol w="1406575">
                   <a:extLst>
                     <a:ext uri="{9D8B030D-6E8A-4147-A177-3AD203B41FA5}">
                       <a16:colId xmlns:a16="http://schemas.microsoft.com/office/drawing/2014/main" val="3749707409"/>
@@ -30975,7 +31610,7 @@
                   </a:extLst>
                 </a:gridCol>
               </a:tblGrid>
-              <a:tr h="610822">
+              <a:tr h="641873">
                 <a:tc>
                   <a:txBody>
                     <a:bodyPr/>
@@ -31210,7 +31845,7 @@
                           <a:latin typeface="Times New Roman" panose="02020603050405020304" pitchFamily="18" charset="0"/>
                           <a:cs typeface="Times New Roman" panose="02020603050405020304" pitchFamily="18" charset="0"/>
                         </a:rPr>
-                        <a:t>Desired number of Participants</a:t>
+                        <a:t>Desired Number of Participants</a:t>
                       </a:r>
                       <a:endParaRPr lang="en-US" sz="1200" dirty="0">
                         <a:solidFill>
@@ -31260,7 +31895,7 @@
                           <a:latin typeface="Times New Roman" panose="02020603050405020304" pitchFamily="18" charset="0"/>
                           <a:cs typeface="Times New Roman" panose="02020603050405020304" pitchFamily="18" charset="0"/>
                         </a:rPr>
-                        <a:t>Total number of desired Participants</a:t>
+                        <a:t>Total Number of Desired Participants</a:t>
                       </a:r>
                       <a:endParaRPr lang="en-US" sz="1200" dirty="0">
                         <a:solidFill>
@@ -31300,7 +31935,7 @@
                   </a:ext>
                 </a:extLst>
               </a:tr>
-              <a:tr h="277276">
+              <a:tr h="546214">
                 <a:tc>
                   <a:txBody>
                     <a:bodyPr/>
@@ -31563,11 +32198,11 @@
                 </a:tc>
                 <a:extLst>
                   <a:ext uri="{0D108BD9-81ED-4DB2-BD59-A6C34878D82A}">
-                    <a16:rowId xmlns:a16="http://schemas.microsoft.com/office/drawing/2014/main" val="5642151"/>
+                    <a16:rowId xmlns:a16="http://schemas.microsoft.com/office/drawing/2014/main" val="1907721012"/>
                   </a:ext>
                 </a:extLst>
               </a:tr>
-              <a:tr h="338981">
+              <a:tr h="359951">
                 <a:tc>
                   <a:txBody>
                     <a:bodyPr/>
@@ -31643,7 +32278,7 @@
                           <a:latin typeface="Times New Roman" panose="02020603050405020304" pitchFamily="18" charset="0"/>
                           <a:cs typeface="Times New Roman" panose="02020603050405020304" pitchFamily="18" charset="0"/>
                         </a:rPr>
-                        <a:t>Electrical House wiring and Electrician</a:t>
+                        <a:t>Electrical House Wiring and Electrician</a:t>
                       </a:r>
                       <a:endParaRPr lang="en-US" sz="1200" dirty="0">
                         <a:solidFill>
@@ -31830,11 +32465,11 @@
                 </a:tc>
                 <a:extLst>
                   <a:ext uri="{0D108BD9-81ED-4DB2-BD59-A6C34878D82A}">
-                    <a16:rowId xmlns:a16="http://schemas.microsoft.com/office/drawing/2014/main" val="1491843898"/>
+                    <a16:rowId xmlns:a16="http://schemas.microsoft.com/office/drawing/2014/main" val="3075179728"/>
                   </a:ext>
                 </a:extLst>
               </a:tr>
-              <a:tr h="338981">
+              <a:tr h="191777">
                 <a:tc>
                   <a:txBody>
                     <a:bodyPr/>
@@ -32097,11 +32732,11 @@
                 </a:tc>
                 <a:extLst>
                   <a:ext uri="{0D108BD9-81ED-4DB2-BD59-A6C34878D82A}">
-                    <a16:rowId xmlns:a16="http://schemas.microsoft.com/office/drawing/2014/main" val="3249393784"/>
+                    <a16:rowId xmlns:a16="http://schemas.microsoft.com/office/drawing/2014/main" val="676522033"/>
                   </a:ext>
                 </a:extLst>
               </a:tr>
-              <a:tr h="277276">
+              <a:tr h="191777">
                 <a:tc>
                   <a:txBody>
                     <a:bodyPr/>
@@ -32249,7 +32884,7 @@
                         </a:spcAft>
                       </a:pPr>
                       <a:r>
-                        <a:rPr lang="en-US" sz="1200">
+                        <a:rPr lang="en-US" sz="1200" dirty="0">
                           <a:solidFill>
                             <a:schemeClr val="tx1"/>
                           </a:solidFill>
@@ -32259,7 +32894,7 @@
                         </a:rPr>
                         <a:t>4</a:t>
                       </a:r>
-                      <a:endParaRPr lang="en-US" sz="1200">
+                      <a:endParaRPr lang="en-US" sz="1200" dirty="0">
                         <a:solidFill>
                           <a:schemeClr val="tx1"/>
                         </a:solidFill>
@@ -32364,11 +32999,11 @@
                 </a:tc>
                 <a:extLst>
                   <a:ext uri="{0D108BD9-81ED-4DB2-BD59-A6C34878D82A}">
-                    <a16:rowId xmlns:a16="http://schemas.microsoft.com/office/drawing/2014/main" val="1069279893"/>
+                    <a16:rowId xmlns:a16="http://schemas.microsoft.com/office/drawing/2014/main" val="1583184532"/>
                   </a:ext>
                 </a:extLst>
               </a:tr>
-              <a:tr h="338981">
+              <a:tr h="191777">
                 <a:tc>
                   <a:txBody>
                     <a:bodyPr/>
@@ -32631,11 +33266,11 @@
                 </a:tc>
                 <a:extLst>
                   <a:ext uri="{0D108BD9-81ED-4DB2-BD59-A6C34878D82A}">
-                    <a16:rowId xmlns:a16="http://schemas.microsoft.com/office/drawing/2014/main" val="3937796238"/>
+                    <a16:rowId xmlns:a16="http://schemas.microsoft.com/office/drawing/2014/main" val="2158867908"/>
                   </a:ext>
                 </a:extLst>
               </a:tr>
-              <a:tr h="277276">
+              <a:tr h="359951">
                 <a:tc>
                   <a:txBody>
                     <a:bodyPr/>
@@ -32823,7 +33458,7 @@
                         </a:spcAft>
                       </a:pPr>
                       <a:r>
-                        <a:rPr lang="en-US" sz="1200">
+                        <a:rPr lang="en-US" sz="1200" dirty="0">
                           <a:solidFill>
                             <a:schemeClr val="tx1"/>
                           </a:solidFill>
@@ -32833,7 +33468,7 @@
                         </a:rPr>
                         <a:t>40</a:t>
                       </a:r>
-                      <a:endParaRPr lang="en-US" sz="1200">
+                      <a:endParaRPr lang="en-US" sz="1200" dirty="0">
                         <a:solidFill>
                           <a:schemeClr val="tx1"/>
                         </a:solidFill>
@@ -32898,11 +33533,11 @@
                 </a:tc>
                 <a:extLst>
                   <a:ext uri="{0D108BD9-81ED-4DB2-BD59-A6C34878D82A}">
-                    <a16:rowId xmlns:a16="http://schemas.microsoft.com/office/drawing/2014/main" val="3722919669"/>
+                    <a16:rowId xmlns:a16="http://schemas.microsoft.com/office/drawing/2014/main" val="673339926"/>
                   </a:ext>
                 </a:extLst>
               </a:tr>
-              <a:tr h="277276">
+              <a:tr h="191777">
                 <a:tc>
                   <a:txBody>
                     <a:bodyPr/>
@@ -33165,11 +33800,11 @@
                 </a:tc>
                 <a:extLst>
                   <a:ext uri="{0D108BD9-81ED-4DB2-BD59-A6C34878D82A}">
-                    <a16:rowId xmlns:a16="http://schemas.microsoft.com/office/drawing/2014/main" val="4007105957"/>
+                    <a16:rowId xmlns:a16="http://schemas.microsoft.com/office/drawing/2014/main" val="1615726241"/>
                   </a:ext>
                 </a:extLst>
               </a:tr>
-              <a:tr h="277276">
+              <a:tr h="359951">
                 <a:tc>
                   <a:txBody>
                     <a:bodyPr/>
@@ -33432,11 +34067,11 @@
                 </a:tc>
                 <a:extLst>
                   <a:ext uri="{0D108BD9-81ED-4DB2-BD59-A6C34878D82A}">
-                    <a16:rowId xmlns:a16="http://schemas.microsoft.com/office/drawing/2014/main" val="1524879149"/>
+                    <a16:rowId xmlns:a16="http://schemas.microsoft.com/office/drawing/2014/main" val="3561751066"/>
                   </a:ext>
                 </a:extLst>
               </a:tr>
-              <a:tr h="277276">
+              <a:tr h="191777">
                 <a:tc>
                   <a:txBody>
                     <a:bodyPr/>
@@ -33699,11 +34334,11 @@
                 </a:tc>
                 <a:extLst>
                   <a:ext uri="{0D108BD9-81ED-4DB2-BD59-A6C34878D82A}">
-                    <a16:rowId xmlns:a16="http://schemas.microsoft.com/office/drawing/2014/main" val="899622001"/>
+                    <a16:rowId xmlns:a16="http://schemas.microsoft.com/office/drawing/2014/main" val="1299283513"/>
                   </a:ext>
                 </a:extLst>
               </a:tr>
-              <a:tr h="277276">
+              <a:tr h="359951">
                 <a:tc>
                   <a:txBody>
                     <a:bodyPr/>
@@ -33966,11 +34601,11 @@
                 </a:tc>
                 <a:extLst>
                   <a:ext uri="{0D108BD9-81ED-4DB2-BD59-A6C34878D82A}">
-                    <a16:rowId xmlns:a16="http://schemas.microsoft.com/office/drawing/2014/main" val="640429737"/>
+                    <a16:rowId xmlns:a16="http://schemas.microsoft.com/office/drawing/2014/main" val="3794388095"/>
                   </a:ext>
                 </a:extLst>
               </a:tr>
-              <a:tr h="277276">
+              <a:tr h="383554">
                 <a:tc>
                   <a:txBody>
                     <a:bodyPr/>
@@ -34291,7 +34926,7 @@
                 </a:tc>
                 <a:extLst>
                   <a:ext uri="{0D108BD9-81ED-4DB2-BD59-A6C34878D82A}">
-                    <a16:rowId xmlns:a16="http://schemas.microsoft.com/office/drawing/2014/main" val="3713784312"/>
+                    <a16:rowId xmlns:a16="http://schemas.microsoft.com/office/drawing/2014/main" val="3160359621"/>
                   </a:ext>
                 </a:extLst>
               </a:tr>
@@ -34304,7 +34939,7 @@
           <p:cNvPr id="6" name="Picture 5">
             <a:extLst>
               <a:ext uri="{FF2B5EF4-FFF2-40B4-BE49-F238E27FC236}">
-                <a16:creationId xmlns:a16="http://schemas.microsoft.com/office/drawing/2014/main" id="{31820802-394E-467A-83F1-34AAC2BCBAAB}"/>
+                <a16:creationId xmlns:a16="http://schemas.microsoft.com/office/drawing/2014/main" id="{518F92F4-20C3-4ED4-8258-3142F8B07ECF}"/>
               </a:ext>
             </a:extLst>
           </p:cNvPr>
@@ -34340,7 +34975,7 @@
           <p:cNvPr id="7" name="Picture 6">
             <a:extLst>
               <a:ext uri="{FF2B5EF4-FFF2-40B4-BE49-F238E27FC236}">
-                <a16:creationId xmlns:a16="http://schemas.microsoft.com/office/drawing/2014/main" id="{640EFDEE-C1EE-4887-B225-E8C1F3B3B9E6}"/>
+                <a16:creationId xmlns:a16="http://schemas.microsoft.com/office/drawing/2014/main" id="{8ABEB961-DE59-464B-AD86-98C6A996725E}"/>
               </a:ext>
             </a:extLst>
           </p:cNvPr>
@@ -34374,7 +35009,7 @@
     </p:spTree>
     <p:extLst>
       <p:ext uri="{BB962C8B-B14F-4D97-AF65-F5344CB8AC3E}">
-        <p14:creationId xmlns:p14="http://schemas.microsoft.com/office/powerpoint/2010/main" val="2476749596"/>
+        <p14:creationId xmlns:p14="http://schemas.microsoft.com/office/powerpoint/2010/main" val="4234998884"/>
       </p:ext>
     </p:extLst>
   </p:cSld>

</xml_diff>